<commit_message>
Update 0608 project06 - 파워포인트 - 민기.pptx
</commit_message>
<xml_diff>
--- a/0 발표용 파워포인트/0608 5차발표/0608 project06 - 파워포인트 - 민기.pptx
+++ b/0 발표용 파워포인트/0608 5차발표/0608 project06 - 파워포인트 - 민기.pptx
@@ -6,7 +6,7 @@
     <p:sldMasterId id="2147483660" r:id="rId2"/>
   </p:sldMasterIdLst>
   <p:notesMasterIdLst>
-    <p:notesMasterId r:id="rId23"/>
+    <p:notesMasterId r:id="rId24"/>
   </p:notesMasterIdLst>
   <p:sldIdLst>
     <p:sldId id="256" r:id="rId3"/>
@@ -29,6 +29,7 @@
     <p:sldId id="277" r:id="rId20"/>
     <p:sldId id="278" r:id="rId21"/>
     <p:sldId id="279" r:id="rId22"/>
+    <p:sldId id="280" r:id="rId23"/>
   </p:sldIdLst>
   <p:sldSz cx="12192000" cy="6858000"/>
   <p:notesSz cx="6858000" cy="9144000"/>
@@ -229,7 +230,7 @@
             <a:fld id="{EFE7F2A0-C7D9-4DBD-AE3B-C1A712DCE501}" type="datetimeFigureOut">
               <a:rPr lang="ko-KR" altLang="en-US" smtClean="0"/>
               <a:pPr/>
-              <a:t>2020-06-04</a:t>
+              <a:t>2020-06-05</a:t>
             </a:fld>
             <a:endParaRPr lang="ko-KR" altLang="en-US"/>
           </a:p>
@@ -630,7 +631,7 @@
             <a:fld id="{272C3D53-FEDF-49EC-8F65-FFFC138B637E}" type="datetimeFigureOut">
               <a:rPr lang="ko-KR" altLang="en-US" smtClean="0"/>
               <a:pPr/>
-              <a:t>2020-06-04</a:t>
+              <a:t>2020-06-05</a:t>
             </a:fld>
             <a:endParaRPr lang="ko-KR" altLang="en-US"/>
           </a:p>
@@ -802,7 +803,7 @@
             <a:fld id="{272C3D53-FEDF-49EC-8F65-FFFC138B637E}" type="datetimeFigureOut">
               <a:rPr lang="ko-KR" altLang="en-US" smtClean="0"/>
               <a:pPr/>
-              <a:t>2020-06-04</a:t>
+              <a:t>2020-06-05</a:t>
             </a:fld>
             <a:endParaRPr lang="ko-KR" altLang="en-US"/>
           </a:p>
@@ -984,7 +985,7 @@
             <a:fld id="{272C3D53-FEDF-49EC-8F65-FFFC138B637E}" type="datetimeFigureOut">
               <a:rPr lang="ko-KR" altLang="en-US" smtClean="0"/>
               <a:pPr/>
-              <a:t>2020-06-04</a:t>
+              <a:t>2020-06-05</a:t>
             </a:fld>
             <a:endParaRPr lang="ko-KR" altLang="en-US"/>
           </a:p>
@@ -1183,7 +1184,7 @@
                 <a:buFont typeface="Arial"/>
                 <a:buNone/>
               </a:pPr>
-              <a:t>2020-06-04</a:t>
+              <a:t>2020-06-05</a:t>
             </a:fld>
             <a:endParaRPr lang="ko-KR" altLang="en-US" sz="1867" kern="0">
               <a:solidFill>
@@ -1382,7 +1383,7 @@
             <a:fld id="{272C3D53-FEDF-49EC-8F65-FFFC138B637E}" type="datetimeFigureOut">
               <a:rPr lang="ko-KR" altLang="en-US" smtClean="0"/>
               <a:pPr/>
-              <a:t>2020-06-04</a:t>
+              <a:t>2020-06-05</a:t>
             </a:fld>
             <a:endParaRPr lang="ko-KR" altLang="en-US"/>
           </a:p>
@@ -1630,7 +1631,7 @@
             <a:fld id="{272C3D53-FEDF-49EC-8F65-FFFC138B637E}" type="datetimeFigureOut">
               <a:rPr lang="ko-KR" altLang="en-US" smtClean="0"/>
               <a:pPr/>
-              <a:t>2020-06-04</a:t>
+              <a:t>2020-06-05</a:t>
             </a:fld>
             <a:endParaRPr lang="ko-KR" altLang="en-US"/>
           </a:p>
@@ -1864,7 +1865,7 @@
             <a:fld id="{272C3D53-FEDF-49EC-8F65-FFFC138B637E}" type="datetimeFigureOut">
               <a:rPr lang="ko-KR" altLang="en-US" smtClean="0"/>
               <a:pPr/>
-              <a:t>2020-06-04</a:t>
+              <a:t>2020-06-05</a:t>
             </a:fld>
             <a:endParaRPr lang="ko-KR" altLang="en-US"/>
           </a:p>
@@ -2233,7 +2234,7 @@
             <a:fld id="{272C3D53-FEDF-49EC-8F65-FFFC138B637E}" type="datetimeFigureOut">
               <a:rPr lang="ko-KR" altLang="en-US" smtClean="0"/>
               <a:pPr/>
-              <a:t>2020-06-04</a:t>
+              <a:t>2020-06-05</a:t>
             </a:fld>
             <a:endParaRPr lang="ko-KR" altLang="en-US"/>
           </a:p>
@@ -2353,7 +2354,7 @@
             <a:fld id="{272C3D53-FEDF-49EC-8F65-FFFC138B637E}" type="datetimeFigureOut">
               <a:rPr lang="ko-KR" altLang="en-US" smtClean="0"/>
               <a:pPr/>
-              <a:t>2020-06-04</a:t>
+              <a:t>2020-06-05</a:t>
             </a:fld>
             <a:endParaRPr lang="ko-KR" altLang="en-US"/>
           </a:p>
@@ -2450,7 +2451,7 @@
             <a:fld id="{272C3D53-FEDF-49EC-8F65-FFFC138B637E}" type="datetimeFigureOut">
               <a:rPr lang="ko-KR" altLang="en-US" smtClean="0"/>
               <a:pPr/>
-              <a:t>2020-06-04</a:t>
+              <a:t>2020-06-05</a:t>
             </a:fld>
             <a:endParaRPr lang="ko-KR" altLang="en-US"/>
           </a:p>
@@ -2729,7 +2730,7 @@
             <a:fld id="{272C3D53-FEDF-49EC-8F65-FFFC138B637E}" type="datetimeFigureOut">
               <a:rPr lang="ko-KR" altLang="en-US" smtClean="0"/>
               <a:pPr/>
-              <a:t>2020-06-04</a:t>
+              <a:t>2020-06-05</a:t>
             </a:fld>
             <a:endParaRPr lang="ko-KR" altLang="en-US"/>
           </a:p>
@@ -2984,7 +2985,7 @@
             <a:fld id="{272C3D53-FEDF-49EC-8F65-FFFC138B637E}" type="datetimeFigureOut">
               <a:rPr lang="ko-KR" altLang="en-US" smtClean="0"/>
               <a:pPr/>
-              <a:t>2020-06-04</a:t>
+              <a:t>2020-06-05</a:t>
             </a:fld>
             <a:endParaRPr lang="ko-KR" altLang="en-US"/>
           </a:p>
@@ -3199,7 +3200,7 @@
             <a:fld id="{272C3D53-FEDF-49EC-8F65-FFFC138B637E}" type="datetimeFigureOut">
               <a:rPr lang="ko-KR" altLang="en-US" smtClean="0"/>
               <a:pPr/>
-              <a:t>2020-06-04</a:t>
+              <a:t>2020-06-05</a:t>
             </a:fld>
             <a:endParaRPr lang="ko-KR" altLang="en-US"/>
           </a:p>
@@ -17565,11 +17566,7 @@
             </a:r>
             <a:r>
               <a:rPr lang="ko-KR" altLang="en-US" sz="1200" dirty="0" smtClean="0"/>
-              <a:t>예치금이 </a:t>
-            </a:r>
-            <a:r>
-              <a:rPr lang="ko-KR" altLang="en-US" sz="1200" dirty="0" smtClean="0"/>
-              <a:t>결제금액보다 적으면 예치금 부족 알림</a:t>
+              <a:t>예치금이 결제금액보다 적으면 예치금 부족 알림</a:t>
             </a:r>
             <a:endParaRPr lang="en-US" altLang="ko-KR" sz="1200" dirty="0" smtClean="0"/>
           </a:p>
@@ -17680,11 +17677,7 @@
             </a:r>
             <a:r>
               <a:rPr lang="ko-KR" altLang="en-US" sz="1200" dirty="0" smtClean="0"/>
-              <a:t> </a:t>
-            </a:r>
-            <a:r>
-              <a:rPr lang="ko-KR" altLang="en-US" sz="1200" dirty="0" smtClean="0"/>
-              <a:t>사용한 예치금 정보 확인 가능</a:t>
+              <a:t> 사용한 예치금 정보 확인 가능</a:t>
             </a:r>
             <a:endParaRPr lang="en-US" altLang="ko-KR" sz="1200" dirty="0" smtClean="0"/>
           </a:p>
@@ -18675,21 +18668,7 @@
                 <a:cs typeface="Arial"/>
                 <a:sym typeface="Arial"/>
               </a:rPr>
-              <a:t>프로젝트 신고목록</a:t>
-            </a:r>
-            <a:r>
-              <a:rPr lang="ko-KR" altLang="en-US" sz="2400" b="1" kern="0" dirty="0" smtClean="0">
-                <a:solidFill>
-                  <a:srgbClr val="000000">
-                    <a:lumMod val="75000"/>
-                    <a:lumOff val="25000"/>
-                  </a:srgbClr>
-                </a:solidFill>
-                <a:latin typeface="맑은 고딕" panose="020B0503020000020004" pitchFamily="50" charset="-127"/>
-                <a:cs typeface="Arial"/>
-                <a:sym typeface="Arial"/>
-              </a:rPr>
-              <a:t> </a:t>
+              <a:t>프로젝트 신고목록 </a:t>
             </a:r>
             <a:r>
               <a:rPr lang="en-US" altLang="ko-KR" sz="2400" b="1" kern="0" dirty="0" smtClean="0">
@@ -18856,11 +18835,7 @@
             </a:r>
             <a:r>
               <a:rPr lang="ko-KR" altLang="en-US" sz="1200" dirty="0" err="1" smtClean="0"/>
-              <a:t>모달</a:t>
-            </a:r>
-            <a:r>
-              <a:rPr lang="ko-KR" altLang="en-US" sz="1200" dirty="0" err="1" smtClean="0"/>
-              <a:t>창</a:t>
+              <a:t>모달창</a:t>
             </a:r>
             <a:r>
               <a:rPr lang="ko-KR" altLang="en-US" sz="1200" dirty="0" smtClean="0"/>
@@ -18890,7 +18865,6 @@
               <a:rPr lang="en-US" altLang="ko-KR" sz="1200" dirty="0" smtClean="0"/>
               <a:t>save</a:t>
             </a:r>
-            <a:endParaRPr lang="en-US" altLang="ko-KR" sz="1200" dirty="0" smtClean="0"/>
           </a:p>
         </p:txBody>
       </p:sp>
@@ -25674,6 +25648,2057 @@
 </p:sld>
 </file>
 
+<file path=ppt/slides/slide21.xml><?xml version="1.0" encoding="utf-8"?>
+<p:sld xmlns:a="http://schemas.openxmlformats.org/drawingml/2006/main" xmlns:r="http://schemas.openxmlformats.org/officeDocument/2006/relationships" xmlns:p="http://schemas.openxmlformats.org/presentationml/2006/main">
+  <p:cSld>
+    <p:spTree>
+      <p:nvGrpSpPr>
+        <p:cNvPr id="1" name=""/>
+        <p:cNvGrpSpPr/>
+        <p:nvPr/>
+      </p:nvGrpSpPr>
+      <p:grpSpPr>
+        <a:xfrm>
+          <a:off x="0" y="0"/>
+          <a:ext cx="0" cy="0"/>
+          <a:chOff x="0" y="0"/>
+          <a:chExt cx="0" cy="0"/>
+        </a:xfrm>
+      </p:grpSpPr>
+      <p:sp>
+        <p:nvSpPr>
+          <p:cNvPr id="6" name="양쪽 모서리가 둥근 사각형 5"/>
+          <p:cNvSpPr/>
+          <p:nvPr/>
+        </p:nvSpPr>
+        <p:spPr>
+          <a:xfrm>
+            <a:off x="143339" y="548680"/>
+            <a:ext cx="11905323" cy="6144683"/>
+          </a:xfrm>
+          <a:prstGeom prst="round2SameRect">
+            <a:avLst>
+              <a:gd name="adj1" fmla="val 0"/>
+              <a:gd name="adj2" fmla="val 2405"/>
+            </a:avLst>
+          </a:prstGeom>
+          <a:solidFill>
+            <a:schemeClr val="bg1"/>
+          </a:solidFill>
+          <a:ln>
+            <a:noFill/>
+          </a:ln>
+          <a:effectLst>
+            <a:outerShdw dist="254000" dir="5400000" sx="97000" sy="97000" algn="t" rotWithShape="0">
+              <a:prstClr val="black">
+                <a:alpha val="40000"/>
+              </a:prstClr>
+            </a:outerShdw>
+          </a:effectLst>
+        </p:spPr>
+        <p:style>
+          <a:lnRef idx="2">
+            <a:schemeClr val="accent1">
+              <a:shade val="50000"/>
+            </a:schemeClr>
+          </a:lnRef>
+          <a:fillRef idx="1">
+            <a:schemeClr val="accent1"/>
+          </a:fillRef>
+          <a:effectRef idx="0">
+            <a:schemeClr val="accent1"/>
+          </a:effectRef>
+          <a:fontRef idx="minor">
+            <a:schemeClr val="lt1"/>
+          </a:fontRef>
+        </p:style>
+        <p:txBody>
+          <a:bodyPr lIns="91438" tIns="45719" rIns="91438" bIns="45719" rtlCol="0" anchor="ctr"/>
+          <a:lstStyle/>
+          <a:p>
+            <a:pPr algn="ctr"/>
+            <a:endParaRPr lang="ko-KR" altLang="en-US">
+              <a:solidFill>
+                <a:prstClr val="white"/>
+              </a:solidFill>
+            </a:endParaRPr>
+          </a:p>
+        </p:txBody>
+      </p:sp>
+      <p:sp>
+        <p:nvSpPr>
+          <p:cNvPr id="5" name="양쪽 모서리가 둥근 사각형 4"/>
+          <p:cNvSpPr/>
+          <p:nvPr/>
+        </p:nvSpPr>
+        <p:spPr>
+          <a:xfrm>
+            <a:off x="143339" y="243880"/>
+            <a:ext cx="11905323" cy="304800"/>
+          </a:xfrm>
+          <a:prstGeom prst="round2SameRect">
+            <a:avLst>
+              <a:gd name="adj1" fmla="val 44667"/>
+              <a:gd name="adj2" fmla="val 0"/>
+            </a:avLst>
+          </a:prstGeom>
+          <a:solidFill>
+            <a:srgbClr val="411F42"/>
+          </a:solidFill>
+          <a:ln>
+            <a:noFill/>
+          </a:ln>
+          <a:effectLst>
+            <a:outerShdw dist="76200" dir="16200000" sx="97000" sy="97000" rotWithShape="0">
+              <a:prstClr val="black">
+                <a:alpha val="40000"/>
+              </a:prstClr>
+            </a:outerShdw>
+          </a:effectLst>
+        </p:spPr>
+        <p:style>
+          <a:lnRef idx="2">
+            <a:schemeClr val="accent1">
+              <a:shade val="50000"/>
+            </a:schemeClr>
+          </a:lnRef>
+          <a:fillRef idx="1">
+            <a:schemeClr val="accent1"/>
+          </a:fillRef>
+          <a:effectRef idx="0">
+            <a:schemeClr val="accent1"/>
+          </a:effectRef>
+          <a:fontRef idx="minor">
+            <a:schemeClr val="lt1"/>
+          </a:fontRef>
+        </p:style>
+        <p:txBody>
+          <a:bodyPr lIns="91438" tIns="45719" rIns="91438" bIns="45719" rtlCol="0" anchor="ctr"/>
+          <a:lstStyle/>
+          <a:p>
+            <a:pPr algn="ctr"/>
+            <a:endParaRPr lang="ko-KR" altLang="en-US">
+              <a:solidFill>
+                <a:prstClr val="white"/>
+              </a:solidFill>
+            </a:endParaRPr>
+          </a:p>
+        </p:txBody>
+      </p:sp>
+      <p:sp>
+        <p:nvSpPr>
+          <p:cNvPr id="7" name="직사각형 6"/>
+          <p:cNvSpPr/>
+          <p:nvPr/>
+        </p:nvSpPr>
+        <p:spPr>
+          <a:xfrm>
+            <a:off x="935120" y="366664"/>
+            <a:ext cx="10613801" cy="72000"/>
+          </a:xfrm>
+          <a:prstGeom prst="rect">
+            <a:avLst/>
+          </a:prstGeom>
+          <a:solidFill>
+            <a:schemeClr val="bg1"/>
+          </a:solidFill>
+          <a:ln>
+            <a:noFill/>
+          </a:ln>
+        </p:spPr>
+        <p:style>
+          <a:lnRef idx="2">
+            <a:schemeClr val="accent1">
+              <a:shade val="50000"/>
+            </a:schemeClr>
+          </a:lnRef>
+          <a:fillRef idx="1">
+            <a:schemeClr val="accent1"/>
+          </a:fillRef>
+          <a:effectRef idx="0">
+            <a:schemeClr val="accent1"/>
+          </a:effectRef>
+          <a:fontRef idx="minor">
+            <a:schemeClr val="lt1"/>
+          </a:fontRef>
+        </p:style>
+        <p:txBody>
+          <a:bodyPr lIns="91438" tIns="45719" rIns="91438" bIns="45719" rtlCol="0" anchor="ctr"/>
+          <a:lstStyle/>
+          <a:p>
+            <a:pPr algn="ctr"/>
+            <a:endParaRPr lang="ko-KR" altLang="en-US">
+              <a:solidFill>
+                <a:prstClr val="white"/>
+              </a:solidFill>
+            </a:endParaRPr>
+          </a:p>
+        </p:txBody>
+      </p:sp>
+      <p:sp>
+        <p:nvSpPr>
+          <p:cNvPr id="8" name="타원 7"/>
+          <p:cNvSpPr/>
+          <p:nvPr/>
+        </p:nvSpPr>
+        <p:spPr>
+          <a:xfrm>
+            <a:off x="576949" y="366664"/>
+            <a:ext cx="75276" cy="72000"/>
+          </a:xfrm>
+          <a:prstGeom prst="ellipse">
+            <a:avLst/>
+          </a:prstGeom>
+          <a:solidFill>
+            <a:srgbClr val="FF6189"/>
+          </a:solidFill>
+          <a:ln>
+            <a:noFill/>
+          </a:ln>
+        </p:spPr>
+        <p:style>
+          <a:lnRef idx="2">
+            <a:schemeClr val="accent1">
+              <a:shade val="50000"/>
+            </a:schemeClr>
+          </a:lnRef>
+          <a:fillRef idx="1">
+            <a:schemeClr val="accent1"/>
+          </a:fillRef>
+          <a:effectRef idx="0">
+            <a:schemeClr val="accent1"/>
+          </a:effectRef>
+          <a:fontRef idx="minor">
+            <a:schemeClr val="lt1"/>
+          </a:fontRef>
+        </p:style>
+        <p:txBody>
+          <a:bodyPr lIns="91438" tIns="45719" rIns="91438" bIns="45719" rtlCol="0" anchor="ctr"/>
+          <a:lstStyle/>
+          <a:p>
+            <a:pPr algn="ctr"/>
+            <a:endParaRPr lang="ko-KR" altLang="en-US">
+              <a:solidFill>
+                <a:prstClr val="white"/>
+              </a:solidFill>
+            </a:endParaRPr>
+          </a:p>
+        </p:txBody>
+      </p:sp>
+      <p:sp>
+        <p:nvSpPr>
+          <p:cNvPr id="9" name="타원 8"/>
+          <p:cNvSpPr/>
+          <p:nvPr/>
+        </p:nvSpPr>
+        <p:spPr>
+          <a:xfrm>
+            <a:off x="766826" y="366664"/>
+            <a:ext cx="75276" cy="72000"/>
+          </a:xfrm>
+          <a:prstGeom prst="ellipse">
+            <a:avLst/>
+          </a:prstGeom>
+          <a:solidFill>
+            <a:srgbClr val="00B0F0"/>
+          </a:solidFill>
+          <a:ln>
+            <a:noFill/>
+          </a:ln>
+        </p:spPr>
+        <p:style>
+          <a:lnRef idx="2">
+            <a:schemeClr val="accent1">
+              <a:shade val="50000"/>
+            </a:schemeClr>
+          </a:lnRef>
+          <a:fillRef idx="1">
+            <a:schemeClr val="accent1"/>
+          </a:fillRef>
+          <a:effectRef idx="0">
+            <a:schemeClr val="accent1"/>
+          </a:effectRef>
+          <a:fontRef idx="minor">
+            <a:schemeClr val="lt1"/>
+          </a:fontRef>
+        </p:style>
+        <p:txBody>
+          <a:bodyPr lIns="91438" tIns="45719" rIns="91438" bIns="45719" rtlCol="0" anchor="ctr"/>
+          <a:lstStyle/>
+          <a:p>
+            <a:pPr algn="ctr"/>
+            <a:endParaRPr lang="ko-KR" altLang="en-US">
+              <a:solidFill>
+                <a:prstClr val="white"/>
+              </a:solidFill>
+            </a:endParaRPr>
+          </a:p>
+        </p:txBody>
+      </p:sp>
+      <p:sp>
+        <p:nvSpPr>
+          <p:cNvPr id="10" name="타원 9"/>
+          <p:cNvSpPr/>
+          <p:nvPr/>
+        </p:nvSpPr>
+        <p:spPr>
+          <a:xfrm>
+            <a:off x="956703" y="366664"/>
+            <a:ext cx="75276" cy="72000"/>
+          </a:xfrm>
+          <a:prstGeom prst="ellipse">
+            <a:avLst/>
+          </a:prstGeom>
+          <a:solidFill>
+            <a:schemeClr val="accent4"/>
+          </a:solidFill>
+          <a:ln>
+            <a:noFill/>
+          </a:ln>
+        </p:spPr>
+        <p:style>
+          <a:lnRef idx="2">
+            <a:schemeClr val="accent1">
+              <a:shade val="50000"/>
+            </a:schemeClr>
+          </a:lnRef>
+          <a:fillRef idx="1">
+            <a:schemeClr val="accent1"/>
+          </a:fillRef>
+          <a:effectRef idx="0">
+            <a:schemeClr val="accent1"/>
+          </a:effectRef>
+          <a:fontRef idx="minor">
+            <a:schemeClr val="lt1"/>
+          </a:fontRef>
+        </p:style>
+        <p:txBody>
+          <a:bodyPr lIns="91438" tIns="45719" rIns="91438" bIns="45719" rtlCol="0" anchor="ctr"/>
+          <a:lstStyle/>
+          <a:p>
+            <a:pPr algn="ctr"/>
+            <a:endParaRPr lang="ko-KR" altLang="en-US">
+              <a:solidFill>
+                <a:prstClr val="white"/>
+              </a:solidFill>
+            </a:endParaRPr>
+          </a:p>
+        </p:txBody>
+      </p:sp>
+      <p:sp>
+        <p:nvSpPr>
+          <p:cNvPr id="12" name="직사각형 11"/>
+          <p:cNvSpPr/>
+          <p:nvPr/>
+        </p:nvSpPr>
+        <p:spPr>
+          <a:xfrm>
+            <a:off x="1871531" y="626201"/>
+            <a:ext cx="10108802" cy="646329"/>
+          </a:xfrm>
+          <a:prstGeom prst="rect">
+            <a:avLst/>
+          </a:prstGeom>
+        </p:spPr>
+        <p:txBody>
+          <a:bodyPr wrap="square" lIns="91438" tIns="45719" rIns="91438" bIns="45719">
+            <a:spAutoFit/>
+          </a:bodyPr>
+          <a:lstStyle/>
+          <a:p>
+            <a:pPr>
+              <a:lnSpc>
+                <a:spcPct val="150000"/>
+              </a:lnSpc>
+            </a:pPr>
+            <a:r>
+              <a:rPr lang="en-US" altLang="ko-KR" sz="2400" b="1" dirty="0" smtClean="0">
+                <a:solidFill>
+                  <a:schemeClr val="tx1">
+                    <a:lumMod val="75000"/>
+                    <a:lumOff val="25000"/>
+                  </a:schemeClr>
+                </a:solidFill>
+                <a:latin typeface="+mj-ea"/>
+                <a:ea typeface="+mj-ea"/>
+              </a:rPr>
+              <a:t>[ </a:t>
+            </a:r>
+            <a:r>
+              <a:rPr lang="ko-KR" altLang="en-US" sz="2400" b="1" dirty="0" err="1" smtClean="0">
+                <a:solidFill>
+                  <a:schemeClr val="tx1">
+                    <a:lumMod val="75000"/>
+                    <a:lumOff val="25000"/>
+                  </a:schemeClr>
+                </a:solidFill>
+                <a:latin typeface="+mj-ea"/>
+                <a:ea typeface="+mj-ea"/>
+              </a:rPr>
+              <a:t>통합테스트</a:t>
+            </a:r>
+            <a:r>
+              <a:rPr lang="ko-KR" altLang="en-US" sz="2400" b="1" dirty="0" smtClean="0">
+                <a:solidFill>
+                  <a:schemeClr val="tx1">
+                    <a:lumMod val="75000"/>
+                    <a:lumOff val="25000"/>
+                  </a:schemeClr>
+                </a:solidFill>
+                <a:latin typeface="+mj-ea"/>
+                <a:ea typeface="+mj-ea"/>
+              </a:rPr>
+              <a:t> </a:t>
+            </a:r>
+            <a:r>
+              <a:rPr lang="en-US" altLang="ko-KR" sz="2400" b="1" dirty="0" smtClean="0">
+                <a:solidFill>
+                  <a:schemeClr val="tx1">
+                    <a:lumMod val="75000"/>
+                    <a:lumOff val="25000"/>
+                  </a:schemeClr>
+                </a:solidFill>
+                <a:latin typeface="+mj-ea"/>
+                <a:ea typeface="+mj-ea"/>
+              </a:rPr>
+              <a:t>] </a:t>
+            </a:r>
+            <a:r>
+              <a:rPr lang="ko-KR" altLang="en-US" sz="2400" b="1" dirty="0" err="1" smtClean="0">
+                <a:solidFill>
+                  <a:schemeClr val="tx1">
+                    <a:lumMod val="75000"/>
+                    <a:lumOff val="25000"/>
+                  </a:schemeClr>
+                </a:solidFill>
+                <a:latin typeface="+mj-ea"/>
+                <a:ea typeface="+mj-ea"/>
+              </a:rPr>
+              <a:t>펀딩하기</a:t>
+            </a:r>
+            <a:endParaRPr lang="ko-KR" altLang="en-US" sz="2000" b="1" dirty="0">
+              <a:solidFill>
+                <a:schemeClr val="tx1">
+                  <a:lumMod val="75000"/>
+                  <a:lumOff val="25000"/>
+                </a:schemeClr>
+              </a:solidFill>
+              <a:latin typeface="+mj-ea"/>
+              <a:ea typeface="+mj-ea"/>
+            </a:endParaRPr>
+          </a:p>
+        </p:txBody>
+      </p:sp>
+      <p:graphicFrame>
+        <p:nvGraphicFramePr>
+          <p:cNvPr id="14" name="표 13"/>
+          <p:cNvGraphicFramePr>
+            <a:graphicFrameLocks noGrp="1"/>
+          </p:cNvGraphicFramePr>
+          <p:nvPr>
+            <p:extLst>
+              <p:ext uri="{D42A27DB-BD31-4B8C-83A1-F6EECF244321}">
+                <p14:modId xmlns:p14="http://schemas.microsoft.com/office/powerpoint/2010/main" val="783313717"/>
+              </p:ext>
+            </p:extLst>
+          </p:nvPr>
+        </p:nvGraphicFramePr>
+        <p:xfrm>
+          <a:off x="842102" y="1402352"/>
+          <a:ext cx="10706820" cy="3410266"/>
+        </p:xfrm>
+        <a:graphic>
+          <a:graphicData uri="http://schemas.openxmlformats.org/drawingml/2006/table">
+            <a:tbl>
+              <a:tblPr/>
+              <a:tblGrid>
+                <a:gridCol w="1953852">
+                  <a:extLst>
+                    <a:ext uri="{9D8B030D-6E8A-4147-A177-3AD203B41FA5}">
+                      <a16:colId xmlns:a16="http://schemas.microsoft.com/office/drawing/2014/main" xmlns="" val="20001"/>
+                    </a:ext>
+                  </a:extLst>
+                </a:gridCol>
+                <a:gridCol w="3006969">
+                  <a:extLst>
+                    <a:ext uri="{9D8B030D-6E8A-4147-A177-3AD203B41FA5}">
+                      <a16:colId xmlns:a16="http://schemas.microsoft.com/office/drawing/2014/main" xmlns="" val="20002"/>
+                    </a:ext>
+                  </a:extLst>
+                </a:gridCol>
+                <a:gridCol w="2913367">
+                  <a:extLst>
+                    <a:ext uri="{9D8B030D-6E8A-4147-A177-3AD203B41FA5}">
+                      <a16:colId xmlns:a16="http://schemas.microsoft.com/office/drawing/2014/main" xmlns="" val="20003"/>
+                    </a:ext>
+                  </a:extLst>
+                </a:gridCol>
+                <a:gridCol w="2832632">
+                  <a:extLst>
+                    <a:ext uri="{9D8B030D-6E8A-4147-A177-3AD203B41FA5}">
+                      <a16:colId xmlns:a16="http://schemas.microsoft.com/office/drawing/2014/main" xmlns="" val="410757781"/>
+                    </a:ext>
+                  </a:extLst>
+                </a:gridCol>
+              </a:tblGrid>
+              <a:tr h="444765">
+                <a:tc>
+                  <a:txBody>
+                    <a:bodyPr/>
+                    <a:lstStyle/>
+                    <a:p>
+                      <a:pPr algn="ctr" fontAlgn="ctr"/>
+                      <a:r>
+                        <a:rPr lang="ko-KR" altLang="en-US" sz="1400" b="1" i="0" u="none" strike="noStrike" dirty="0" smtClean="0">
+                          <a:solidFill>
+                            <a:schemeClr val="bg1"/>
+                          </a:solidFill>
+                          <a:effectLst/>
+                          <a:latin typeface="나눔바른고딕" pitchFamily="50" charset="-127"/>
+                          <a:ea typeface="나눔바른고딕" pitchFamily="50" charset="-127"/>
+                        </a:rPr>
+                        <a:t>테스트 항목</a:t>
+                      </a:r>
+                      <a:endParaRPr lang="en-US" altLang="ko-KR" sz="1400" b="1" i="0" u="none" strike="noStrike" dirty="0">
+                        <a:solidFill>
+                          <a:schemeClr val="bg1"/>
+                        </a:solidFill>
+                        <a:effectLst/>
+                        <a:latin typeface="나눔바른고딕" pitchFamily="50" charset="-127"/>
+                        <a:ea typeface="나눔바른고딕" pitchFamily="50" charset="-127"/>
+                      </a:endParaRPr>
+                    </a:p>
+                  </a:txBody>
+                  <a:tcPr marL="5314" marR="5314" marT="5314" marB="0" anchor="ctr">
+                    <a:solidFill>
+                      <a:srgbClr val="FF9E00"/>
+                    </a:solidFill>
+                  </a:tcPr>
+                </a:tc>
+                <a:tc>
+                  <a:txBody>
+                    <a:bodyPr/>
+                    <a:lstStyle/>
+                    <a:p>
+                      <a:pPr algn="ctr" fontAlgn="ctr"/>
+                      <a:r>
+                        <a:rPr lang="ko-KR" altLang="en-US" sz="1400" b="1" u="none" strike="noStrike" dirty="0" err="1" smtClean="0">
+                          <a:solidFill>
+                            <a:schemeClr val="bg1"/>
+                          </a:solidFill>
+                          <a:effectLst/>
+                          <a:latin typeface="나눔바른고딕" pitchFamily="50" charset="-127"/>
+                          <a:ea typeface="나눔바른고딕" pitchFamily="50" charset="-127"/>
+                        </a:rPr>
+                        <a:t>기대결과</a:t>
+                      </a:r>
+                      <a:endParaRPr lang="ko-KR" altLang="en-US" sz="1400" b="1" i="0" u="none" strike="noStrike" dirty="0">
+                        <a:solidFill>
+                          <a:schemeClr val="bg1"/>
+                        </a:solidFill>
+                        <a:effectLst/>
+                        <a:latin typeface="나눔바른고딕" pitchFamily="50" charset="-127"/>
+                        <a:ea typeface="나눔바른고딕" pitchFamily="50" charset="-127"/>
+                      </a:endParaRPr>
+                    </a:p>
+                  </a:txBody>
+                  <a:tcPr marL="5314" marR="5314" marT="5314" marB="0" anchor="ctr">
+                    <a:solidFill>
+                      <a:srgbClr val="FF9E00"/>
+                    </a:solidFill>
+                  </a:tcPr>
+                </a:tc>
+                <a:tc>
+                  <a:txBody>
+                    <a:bodyPr/>
+                    <a:lstStyle/>
+                    <a:p>
+                      <a:pPr algn="ctr" fontAlgn="ctr"/>
+                      <a:r>
+                        <a:rPr lang="ko-KR" altLang="en-US" sz="1400" b="1" u="none" strike="noStrike" dirty="0" smtClean="0">
+                          <a:solidFill>
+                            <a:schemeClr val="bg1"/>
+                          </a:solidFill>
+                          <a:effectLst/>
+                          <a:latin typeface="나눔바른고딕" pitchFamily="50" charset="-127"/>
+                          <a:ea typeface="나눔바른고딕" pitchFamily="50" charset="-127"/>
+                        </a:rPr>
+                        <a:t>테스트 결과</a:t>
+                      </a:r>
+                      <a:endParaRPr lang="ko-KR" altLang="en-US" sz="1400" b="1" i="0" u="none" strike="noStrike" dirty="0">
+                        <a:solidFill>
+                          <a:schemeClr val="bg1"/>
+                        </a:solidFill>
+                        <a:effectLst/>
+                        <a:latin typeface="나눔바른고딕" pitchFamily="50" charset="-127"/>
+                        <a:ea typeface="나눔바른고딕" pitchFamily="50" charset="-127"/>
+                      </a:endParaRPr>
+                    </a:p>
+                  </a:txBody>
+                  <a:tcPr marL="5314" marR="5314" marT="5314" marB="0" anchor="ctr">
+                    <a:solidFill>
+                      <a:srgbClr val="FF9E00"/>
+                    </a:solidFill>
+                  </a:tcPr>
+                </a:tc>
+                <a:tc>
+                  <a:txBody>
+                    <a:bodyPr/>
+                    <a:lstStyle/>
+                    <a:p>
+                      <a:pPr algn="ctr" fontAlgn="ctr"/>
+                      <a:r>
+                        <a:rPr lang="ko-KR" altLang="en-US" sz="1400" b="1" i="0" u="none" strike="noStrike" dirty="0" smtClean="0">
+                          <a:solidFill>
+                            <a:schemeClr val="bg1"/>
+                          </a:solidFill>
+                          <a:effectLst/>
+                          <a:latin typeface="나눔바른고딕" pitchFamily="50" charset="-127"/>
+                          <a:ea typeface="나눔바른고딕" pitchFamily="50" charset="-127"/>
+                        </a:rPr>
+                        <a:t>수정 및 결과</a:t>
+                      </a:r>
+                      <a:endParaRPr lang="ko-KR" altLang="en-US" sz="1400" b="1" i="0" u="none" strike="noStrike" dirty="0">
+                        <a:solidFill>
+                          <a:schemeClr val="bg1"/>
+                        </a:solidFill>
+                        <a:effectLst/>
+                        <a:latin typeface="나눔바른고딕" pitchFamily="50" charset="-127"/>
+                        <a:ea typeface="나눔바른고딕" pitchFamily="50" charset="-127"/>
+                      </a:endParaRPr>
+                    </a:p>
+                  </a:txBody>
+                  <a:tcPr marL="5314" marR="5314" marT="5314" marB="0" anchor="ctr">
+                    <a:solidFill>
+                      <a:srgbClr val="FF9E00"/>
+                    </a:solidFill>
+                  </a:tcPr>
+                </a:tc>
+                <a:extLst>
+                  <a:ext uri="{0D108BD9-81ED-4DB2-BD59-A6C34878D82A}">
+                    <a16:rowId xmlns:a16="http://schemas.microsoft.com/office/drawing/2014/main" xmlns="" val="10000"/>
+                  </a:ext>
+                </a:extLst>
+              </a:tr>
+              <a:tr h="1541341">
+                <a:tc>
+                  <a:txBody>
+                    <a:bodyPr/>
+                    <a:lstStyle/>
+                    <a:p>
+                      <a:pPr algn="ctr" fontAlgn="ctr"/>
+                      <a:r>
+                        <a:rPr lang="ko-KR" altLang="en-US" sz="1200" b="1" i="0" u="none" strike="noStrike" dirty="0" smtClean="0">
+                          <a:solidFill>
+                            <a:srgbClr val="000000"/>
+                          </a:solidFill>
+                          <a:effectLst/>
+                          <a:latin typeface="나눔바른고딕" pitchFamily="50" charset="-127"/>
+                          <a:ea typeface="나눔바른고딕" pitchFamily="50" charset="-127"/>
+                        </a:rPr>
+                        <a:t>프로젝트 </a:t>
+                      </a:r>
+                      <a:r>
+                        <a:rPr lang="ko-KR" altLang="en-US" sz="1200" b="1" i="0" u="none" strike="noStrike" dirty="0" err="1" smtClean="0">
+                          <a:solidFill>
+                            <a:srgbClr val="000000"/>
+                          </a:solidFill>
+                          <a:effectLst/>
+                          <a:latin typeface="나눔바른고딕" pitchFamily="50" charset="-127"/>
+                          <a:ea typeface="나눔바른고딕" pitchFamily="50" charset="-127"/>
+                        </a:rPr>
+                        <a:t>펀딩</a:t>
+                      </a:r>
+                      <a:r>
+                        <a:rPr lang="ko-KR" altLang="en-US" sz="1200" b="1" i="0" u="none" strike="noStrike" dirty="0" smtClean="0">
+                          <a:solidFill>
+                            <a:srgbClr val="000000"/>
+                          </a:solidFill>
+                          <a:effectLst/>
+                          <a:latin typeface="나눔바른고딕" pitchFamily="50" charset="-127"/>
+                          <a:ea typeface="나눔바른고딕" pitchFamily="50" charset="-127"/>
+                        </a:rPr>
+                        <a:t> 옵션선택</a:t>
+                      </a:r>
+                      <a:endParaRPr lang="ko-KR" altLang="en-US" sz="1200" b="1" i="0" u="none" strike="noStrike" dirty="0">
+                        <a:solidFill>
+                          <a:srgbClr val="000000"/>
+                        </a:solidFill>
+                        <a:effectLst/>
+                        <a:latin typeface="나눔바른고딕" pitchFamily="50" charset="-127"/>
+                        <a:ea typeface="나눔바른고딕" pitchFamily="50" charset="-127"/>
+                      </a:endParaRPr>
+                    </a:p>
+                  </a:txBody>
+                  <a:tcPr marL="5314" marR="5314" marT="5314" marB="0" anchor="ctr">
+                    <a:solidFill>
+                      <a:schemeClr val="bg1"/>
+                    </a:solidFill>
+                  </a:tcPr>
+                </a:tc>
+                <a:tc>
+                  <a:txBody>
+                    <a:bodyPr/>
+                    <a:lstStyle/>
+                    <a:p>
+                      <a:pPr algn="l" fontAlgn="ctr"/>
+                      <a:r>
+                        <a:rPr lang="en-US" altLang="ko-KR" sz="1200" b="1" i="0" u="none" strike="noStrike" dirty="0" smtClean="0">
+                          <a:solidFill>
+                            <a:srgbClr val="000000"/>
+                          </a:solidFill>
+                          <a:effectLst/>
+                          <a:latin typeface="나눔바른고딕" pitchFamily="50" charset="-127"/>
+                          <a:ea typeface="나눔바른고딕" pitchFamily="50" charset="-127"/>
+                        </a:rPr>
+                        <a:t>1</a:t>
+                      </a:r>
+                      <a:r>
+                        <a:rPr lang="en-US" altLang="ko-KR" sz="1200" b="1" i="0" u="none" strike="noStrike" dirty="0" smtClean="0">
+                          <a:solidFill>
+                            <a:srgbClr val="000000"/>
+                          </a:solidFill>
+                          <a:effectLst/>
+                          <a:latin typeface="나눔바른고딕" pitchFamily="50" charset="-127"/>
+                          <a:ea typeface="나눔바른고딕" pitchFamily="50" charset="-127"/>
+                        </a:rPr>
+                        <a:t>.</a:t>
+                      </a:r>
+                      <a:r>
+                        <a:rPr lang="ko-KR" altLang="en-US" sz="1200" b="1" i="0" u="none" strike="noStrike" dirty="0" smtClean="0">
+                          <a:solidFill>
+                            <a:srgbClr val="000000"/>
+                          </a:solidFill>
+                          <a:effectLst/>
+                          <a:latin typeface="나눔바른고딕" pitchFamily="50" charset="-127"/>
+                          <a:ea typeface="나눔바른고딕" pitchFamily="50" charset="-127"/>
+                        </a:rPr>
+                        <a:t> 해당 프로젝트의 옵션 선택 페이지</a:t>
+                      </a:r>
+                      <a:endParaRPr lang="en-US" altLang="ko-KR" sz="1200" b="1" i="0" u="none" strike="noStrike" dirty="0" smtClean="0">
+                        <a:solidFill>
+                          <a:srgbClr val="000000"/>
+                        </a:solidFill>
+                        <a:effectLst/>
+                        <a:latin typeface="나눔바른고딕" pitchFamily="50" charset="-127"/>
+                        <a:ea typeface="나눔바른고딕" pitchFamily="50" charset="-127"/>
+                      </a:endParaRPr>
+                    </a:p>
+                    <a:p>
+                      <a:pPr algn="l" fontAlgn="ctr"/>
+                      <a:r>
+                        <a:rPr lang="en-US" altLang="ko-KR" sz="1200" b="1" i="0" u="none" strike="noStrike" dirty="0" smtClean="0">
+                          <a:solidFill>
+                            <a:srgbClr val="000000"/>
+                          </a:solidFill>
+                          <a:effectLst/>
+                          <a:latin typeface="나눔바른고딕" pitchFamily="50" charset="-127"/>
+                          <a:ea typeface="나눔바른고딕" pitchFamily="50" charset="-127"/>
+                        </a:rPr>
+                        <a:t>2. </a:t>
+                      </a:r>
+                      <a:r>
+                        <a:rPr lang="ko-KR" altLang="en-US" sz="1200" b="1" i="0" u="none" strike="noStrike" dirty="0" smtClean="0">
+                          <a:solidFill>
+                            <a:srgbClr val="000000"/>
+                          </a:solidFill>
+                          <a:effectLst/>
+                          <a:latin typeface="나눔바른고딕" pitchFamily="50" charset="-127"/>
+                          <a:ea typeface="나눔바른고딕" pitchFamily="50" charset="-127"/>
+                        </a:rPr>
+                        <a:t>옵션 선택 후 다음단계로 버튼 클릭 시 선택한 옵션의 값을 가지고 </a:t>
+                      </a:r>
+                      <a:r>
+                        <a:rPr lang="ko-KR" altLang="en-US" sz="1200" b="1" i="0" u="none" strike="noStrike" dirty="0" err="1" smtClean="0">
+                          <a:solidFill>
+                            <a:srgbClr val="000000"/>
+                          </a:solidFill>
+                          <a:effectLst/>
+                          <a:latin typeface="나눔바른고딕" pitchFamily="50" charset="-127"/>
+                          <a:ea typeface="나눔바른고딕" pitchFamily="50" charset="-127"/>
+                        </a:rPr>
+                        <a:t>펀딩결제</a:t>
+                      </a:r>
+                      <a:r>
+                        <a:rPr lang="ko-KR" altLang="en-US" sz="1200" b="1" i="0" u="none" strike="noStrike" dirty="0" smtClean="0">
+                          <a:solidFill>
+                            <a:srgbClr val="000000"/>
+                          </a:solidFill>
+                          <a:effectLst/>
+                          <a:latin typeface="나눔바른고딕" pitchFamily="50" charset="-127"/>
+                          <a:ea typeface="나눔바른고딕" pitchFamily="50" charset="-127"/>
+                        </a:rPr>
+                        <a:t> 정보 입력 페이지로 이동</a:t>
+                      </a:r>
+                      <a:endParaRPr lang="ko-KR" altLang="en-US" sz="1200" b="1" i="0" u="none" strike="noStrike" dirty="0">
+                        <a:solidFill>
+                          <a:srgbClr val="000000"/>
+                        </a:solidFill>
+                        <a:effectLst/>
+                        <a:latin typeface="나눔바른고딕" pitchFamily="50" charset="-127"/>
+                        <a:ea typeface="나눔바른고딕" pitchFamily="50" charset="-127"/>
+                      </a:endParaRPr>
+                    </a:p>
+                  </a:txBody>
+                  <a:tcPr marL="72000" marR="72000" marT="72000" marB="72000">
+                    <a:solidFill>
+                      <a:schemeClr val="bg1"/>
+                    </a:solidFill>
+                  </a:tcPr>
+                </a:tc>
+                <a:tc>
+                  <a:txBody>
+                    <a:bodyPr/>
+                    <a:lstStyle/>
+                    <a:p>
+                      <a:pPr algn="l" fontAlgn="ctr"/>
+                      <a:r>
+                        <a:rPr lang="en-US" altLang="ko-KR" sz="1200" b="1" i="0" u="none" strike="noStrike" dirty="0" smtClean="0">
+                          <a:solidFill>
+                            <a:srgbClr val="000000"/>
+                          </a:solidFill>
+                          <a:effectLst/>
+                          <a:latin typeface="나눔바른고딕" pitchFamily="50" charset="-127"/>
+                          <a:ea typeface="나눔바른고딕" pitchFamily="50" charset="-127"/>
+                        </a:rPr>
+                        <a:t>1-1. </a:t>
+                      </a:r>
+                      <a:r>
+                        <a:rPr lang="ko-KR" altLang="en-US" sz="1200" b="1" i="0" u="none" strike="noStrike" dirty="0" smtClean="0">
+                          <a:solidFill>
+                            <a:srgbClr val="000000"/>
+                          </a:solidFill>
+                          <a:effectLst/>
+                          <a:latin typeface="나눔바른고딕" pitchFamily="50" charset="-127"/>
+                          <a:ea typeface="나눔바른고딕" pitchFamily="50" charset="-127"/>
+                        </a:rPr>
+                        <a:t>정상적으로 옵션 가져옴</a:t>
+                      </a:r>
+                      <a:endParaRPr lang="en-US" altLang="ko-KR" sz="1200" b="1" i="0" u="none" strike="noStrike" dirty="0" smtClean="0">
+                        <a:solidFill>
+                          <a:srgbClr val="000000"/>
+                        </a:solidFill>
+                        <a:effectLst/>
+                        <a:latin typeface="나눔바른고딕" pitchFamily="50" charset="-127"/>
+                        <a:ea typeface="나눔바른고딕" pitchFamily="50" charset="-127"/>
+                      </a:endParaRPr>
+                    </a:p>
+                    <a:p>
+                      <a:pPr algn="l" fontAlgn="ctr"/>
+                      <a:r>
+                        <a:rPr lang="en-US" altLang="ko-KR" sz="1200" b="1" i="0" u="none" strike="noStrike" dirty="0" smtClean="0">
+                          <a:solidFill>
+                            <a:srgbClr val="000000"/>
+                          </a:solidFill>
+                          <a:effectLst/>
+                          <a:latin typeface="나눔바른고딕" pitchFamily="50" charset="-127"/>
+                          <a:ea typeface="나눔바른고딕" pitchFamily="50" charset="-127"/>
+                        </a:rPr>
+                        <a:t>2-1. </a:t>
+                      </a:r>
+                      <a:r>
+                        <a:rPr lang="ko-KR" altLang="en-US" sz="1200" b="1" i="0" u="none" strike="noStrike" dirty="0" smtClean="0">
+                          <a:solidFill>
+                            <a:srgbClr val="000000"/>
+                          </a:solidFill>
+                          <a:effectLst/>
+                          <a:latin typeface="나눔바른고딕" pitchFamily="50" charset="-127"/>
+                          <a:ea typeface="나눔바른고딕" pitchFamily="50" charset="-127"/>
+                        </a:rPr>
+                        <a:t>선택한 옵션의 값을 가지고 </a:t>
+                      </a:r>
+                      <a:r>
+                        <a:rPr lang="ko-KR" altLang="en-US" sz="1200" b="1" i="0" u="none" strike="noStrike" dirty="0" err="1" smtClean="0">
+                          <a:solidFill>
+                            <a:srgbClr val="000000"/>
+                          </a:solidFill>
+                          <a:effectLst/>
+                          <a:latin typeface="나눔바른고딕" pitchFamily="50" charset="-127"/>
+                          <a:ea typeface="나눔바른고딕" pitchFamily="50" charset="-127"/>
+                        </a:rPr>
+                        <a:t>펀딩결제</a:t>
+                      </a:r>
+                      <a:r>
+                        <a:rPr lang="ko-KR" altLang="en-US" sz="1200" b="1" i="0" u="none" strike="noStrike" dirty="0" smtClean="0">
+                          <a:solidFill>
+                            <a:srgbClr val="000000"/>
+                          </a:solidFill>
+                          <a:effectLst/>
+                          <a:latin typeface="나눔바른고딕" pitchFamily="50" charset="-127"/>
+                          <a:ea typeface="나눔바른고딕" pitchFamily="50" charset="-127"/>
+                        </a:rPr>
+                        <a:t> 페이지로 이동</a:t>
+                      </a:r>
+                      <a:endParaRPr lang="en-US" altLang="ko-KR" sz="1200" b="1" i="0" u="none" strike="noStrike" dirty="0" smtClean="0">
+                        <a:solidFill>
+                          <a:srgbClr val="000000"/>
+                        </a:solidFill>
+                        <a:effectLst/>
+                        <a:latin typeface="나눔바른고딕" pitchFamily="50" charset="-127"/>
+                        <a:ea typeface="나눔바른고딕" pitchFamily="50" charset="-127"/>
+                      </a:endParaRPr>
+                    </a:p>
+                    <a:p>
+                      <a:pPr algn="l" fontAlgn="ctr"/>
+                      <a:r>
+                        <a:rPr lang="en-US" altLang="ko-KR" sz="1200" b="1" i="0" u="none" strike="noStrike" dirty="0" smtClean="0">
+                          <a:solidFill>
+                            <a:srgbClr val="000000"/>
+                          </a:solidFill>
+                          <a:effectLst/>
+                          <a:latin typeface="나눔바른고딕" pitchFamily="50" charset="-127"/>
+                          <a:ea typeface="나눔바른고딕" pitchFamily="50" charset="-127"/>
+                        </a:rPr>
+                        <a:t>2-2. </a:t>
+                      </a:r>
+                      <a:r>
+                        <a:rPr lang="ko-KR" altLang="en-US" sz="1200" b="1" i="0" u="none" strike="noStrike" dirty="0" smtClean="0">
+                          <a:solidFill>
+                            <a:srgbClr val="000000"/>
+                          </a:solidFill>
+                          <a:effectLst/>
+                          <a:latin typeface="나눔바른고딕" pitchFamily="50" charset="-127"/>
+                          <a:ea typeface="나눔바른고딕" pitchFamily="50" charset="-127"/>
+                        </a:rPr>
+                        <a:t>이용약관 체크박스 유효성검사 필요</a:t>
+                      </a:r>
+                      <a:endParaRPr lang="en-US" altLang="ko-KR" sz="1200" b="1" i="0" u="none" strike="noStrike" dirty="0">
+                        <a:solidFill>
+                          <a:srgbClr val="000000"/>
+                        </a:solidFill>
+                        <a:effectLst/>
+                        <a:latin typeface="나눔바른고딕" pitchFamily="50" charset="-127"/>
+                        <a:ea typeface="나눔바른고딕" pitchFamily="50" charset="-127"/>
+                      </a:endParaRPr>
+                    </a:p>
+                  </a:txBody>
+                  <a:tcPr marL="72000" marR="72000" marT="72000" marB="72000">
+                    <a:solidFill>
+                      <a:schemeClr val="bg1"/>
+                    </a:solidFill>
+                  </a:tcPr>
+                </a:tc>
+                <a:tc>
+                  <a:txBody>
+                    <a:bodyPr/>
+                    <a:lstStyle/>
+                    <a:p>
+                      <a:pPr algn="l" fontAlgn="ctr"/>
+                      <a:r>
+                        <a:rPr lang="en-US" altLang="ko-KR" sz="1200" b="1" i="0" u="none" strike="noStrike" dirty="0" smtClean="0">
+                          <a:solidFill>
+                            <a:srgbClr val="000000"/>
+                          </a:solidFill>
+                          <a:effectLst/>
+                          <a:latin typeface="나눔바른고딕" pitchFamily="50" charset="-127"/>
+                          <a:ea typeface="나눔바른고딕" pitchFamily="50" charset="-127"/>
+                        </a:rPr>
+                        <a:t>2-2. </a:t>
+                      </a:r>
+                      <a:r>
+                        <a:rPr lang="ko-KR" altLang="en-US" sz="1200" b="1" i="0" u="none" strike="noStrike" dirty="0" smtClean="0">
+                          <a:solidFill>
+                            <a:srgbClr val="000000"/>
+                          </a:solidFill>
+                          <a:effectLst/>
+                          <a:latin typeface="나눔바른고딕" pitchFamily="50" charset="-127"/>
+                          <a:ea typeface="나눔바른고딕" pitchFamily="50" charset="-127"/>
+                        </a:rPr>
+                        <a:t>이용약관 체크박스 유효성검사 필요</a:t>
+                      </a:r>
+                      <a:endParaRPr lang="en-US" altLang="ko-KR" sz="1200" b="1" i="0" u="none" strike="noStrike" dirty="0" smtClean="0">
+                        <a:solidFill>
+                          <a:srgbClr val="000000"/>
+                        </a:solidFill>
+                        <a:effectLst/>
+                        <a:latin typeface="나눔바른고딕" pitchFamily="50" charset="-127"/>
+                        <a:ea typeface="나눔바른고딕" pitchFamily="50" charset="-127"/>
+                      </a:endParaRPr>
+                    </a:p>
+                    <a:p>
+                      <a:pPr algn="l" fontAlgn="ctr"/>
+                      <a:r>
+                        <a:rPr lang="en-US" altLang="ko-KR" sz="1200" b="1" i="0" u="none" strike="noStrike" dirty="0" smtClean="0">
+                          <a:solidFill>
+                            <a:srgbClr val="000000"/>
+                          </a:solidFill>
+                          <a:effectLst/>
+                          <a:latin typeface="나눔바른고딕" pitchFamily="50" charset="-127"/>
+                          <a:ea typeface="나눔바른고딕" pitchFamily="50" charset="-127"/>
+                          <a:sym typeface="Wingdings" panose="05000000000000000000" pitchFamily="2" charset="2"/>
+                        </a:rPr>
+                        <a:t> </a:t>
+                      </a:r>
+                      <a:r>
+                        <a:rPr lang="ko-KR" altLang="en-US" sz="1200" b="1" i="0" u="none" strike="noStrike" dirty="0" smtClean="0">
+                          <a:solidFill>
+                            <a:srgbClr val="000000"/>
+                          </a:solidFill>
+                          <a:effectLst/>
+                          <a:latin typeface="나눔바른고딕" pitchFamily="50" charset="-127"/>
+                          <a:ea typeface="나눔바른고딕" pitchFamily="50" charset="-127"/>
+                          <a:sym typeface="Wingdings" panose="05000000000000000000" pitchFamily="2" charset="2"/>
+                        </a:rPr>
+                        <a:t>기존의 체크박스는 체크취소도 불가했기 때문에 체크박스의 </a:t>
+                      </a:r>
+                      <a:r>
+                        <a:rPr lang="en-US" altLang="ko-KR" sz="1200" b="1" i="0" u="none" strike="noStrike" dirty="0" smtClean="0">
+                          <a:solidFill>
+                            <a:srgbClr val="000000"/>
+                          </a:solidFill>
+                          <a:effectLst/>
+                          <a:latin typeface="나눔바른고딕" pitchFamily="50" charset="-127"/>
+                          <a:ea typeface="나눔바른고딕" pitchFamily="50" charset="-127"/>
+                          <a:sym typeface="Wingdings" panose="05000000000000000000" pitchFamily="2" charset="2"/>
+                        </a:rPr>
+                        <a:t>CSS</a:t>
+                      </a:r>
+                      <a:r>
+                        <a:rPr lang="ko-KR" altLang="en-US" sz="1200" b="1" i="0" u="none" strike="noStrike" dirty="0" smtClean="0">
+                          <a:solidFill>
+                            <a:srgbClr val="000000"/>
+                          </a:solidFill>
+                          <a:effectLst/>
+                          <a:latin typeface="나눔바른고딕" pitchFamily="50" charset="-127"/>
+                          <a:ea typeface="나눔바른고딕" pitchFamily="50" charset="-127"/>
+                          <a:sym typeface="Wingdings" panose="05000000000000000000" pitchFamily="2" charset="2"/>
+                        </a:rPr>
+                        <a:t>를 수정</a:t>
+                      </a:r>
+                      <a:r>
+                        <a:rPr lang="en-US" altLang="ko-KR" sz="1200" b="1" i="0" u="none" strike="noStrike" dirty="0" smtClean="0">
+                          <a:solidFill>
+                            <a:srgbClr val="000000"/>
+                          </a:solidFill>
+                          <a:effectLst/>
+                          <a:latin typeface="나눔바른고딕" pitchFamily="50" charset="-127"/>
+                          <a:ea typeface="나눔바른고딕" pitchFamily="50" charset="-127"/>
+                          <a:sym typeface="Wingdings" panose="05000000000000000000" pitchFamily="2" charset="2"/>
+                        </a:rPr>
+                        <a:t>,</a:t>
+                      </a:r>
+                      <a:r>
+                        <a:rPr lang="en-US" altLang="ko-KR" sz="1200" b="1" i="0" u="none" strike="noStrike" baseline="0" dirty="0" smtClean="0">
+                          <a:solidFill>
+                            <a:srgbClr val="000000"/>
+                          </a:solidFill>
+                          <a:effectLst/>
+                          <a:latin typeface="나눔바른고딕" pitchFamily="50" charset="-127"/>
+                          <a:ea typeface="나눔바른고딕" pitchFamily="50" charset="-127"/>
+                          <a:sym typeface="Wingdings" panose="05000000000000000000" pitchFamily="2" charset="2"/>
+                        </a:rPr>
+                        <a:t> </a:t>
+                      </a:r>
+                      <a:r>
+                        <a:rPr lang="ko-KR" altLang="en-US" sz="1200" b="1" i="0" u="none" strike="noStrike" baseline="0" dirty="0" smtClean="0">
+                          <a:solidFill>
+                            <a:srgbClr val="000000"/>
+                          </a:solidFill>
+                          <a:effectLst/>
+                          <a:latin typeface="나눔바른고딕" pitchFamily="50" charset="-127"/>
+                          <a:ea typeface="나눔바른고딕" pitchFamily="50" charset="-127"/>
+                          <a:sym typeface="Wingdings" panose="05000000000000000000" pitchFamily="2" charset="2"/>
+                        </a:rPr>
+                        <a:t>또한 체크박스 전체 체크가 되야 </a:t>
+                      </a:r>
+                      <a:r>
+                        <a:rPr lang="ko-KR" altLang="en-US" sz="1200" b="1" i="0" u="none" strike="noStrike" baseline="0" dirty="0" err="1" smtClean="0">
+                          <a:solidFill>
+                            <a:srgbClr val="000000"/>
+                          </a:solidFill>
+                          <a:effectLst/>
+                          <a:latin typeface="나눔바른고딕" pitchFamily="50" charset="-127"/>
+                          <a:ea typeface="나눔바른고딕" pitchFamily="50" charset="-127"/>
+                          <a:sym typeface="Wingdings" panose="05000000000000000000" pitchFamily="2" charset="2"/>
+                        </a:rPr>
+                        <a:t>펀딩결제</a:t>
+                      </a:r>
+                      <a:r>
+                        <a:rPr lang="ko-KR" altLang="en-US" sz="1200" b="1" i="0" u="none" strike="noStrike" baseline="0" dirty="0" smtClean="0">
+                          <a:solidFill>
+                            <a:srgbClr val="000000"/>
+                          </a:solidFill>
+                          <a:effectLst/>
+                          <a:latin typeface="나눔바른고딕" pitchFamily="50" charset="-127"/>
+                          <a:ea typeface="나눔바른고딕" pitchFamily="50" charset="-127"/>
+                          <a:sym typeface="Wingdings" panose="05000000000000000000" pitchFamily="2" charset="2"/>
+                        </a:rPr>
+                        <a:t> 페이지 </a:t>
+                      </a:r>
+                      <a:r>
+                        <a:rPr lang="ko-KR" altLang="en-US" sz="1200" b="1" i="0" u="none" strike="noStrike" baseline="0" dirty="0" err="1" smtClean="0">
+                          <a:solidFill>
+                            <a:srgbClr val="000000"/>
+                          </a:solidFill>
+                          <a:effectLst/>
+                          <a:latin typeface="나눔바른고딕" pitchFamily="50" charset="-127"/>
+                          <a:ea typeface="나눔바른고딕" pitchFamily="50" charset="-127"/>
+                          <a:sym typeface="Wingdings" panose="05000000000000000000" pitchFamily="2" charset="2"/>
+                        </a:rPr>
+                        <a:t>이동가능하게</a:t>
+                      </a:r>
+                      <a:r>
+                        <a:rPr lang="ko-KR" altLang="en-US" sz="1200" b="1" i="0" u="none" strike="noStrike" baseline="0" dirty="0" smtClean="0">
+                          <a:solidFill>
+                            <a:srgbClr val="000000"/>
+                          </a:solidFill>
+                          <a:effectLst/>
+                          <a:latin typeface="나눔바른고딕" pitchFamily="50" charset="-127"/>
+                          <a:ea typeface="나눔바른고딕" pitchFamily="50" charset="-127"/>
+                          <a:sym typeface="Wingdings" panose="05000000000000000000" pitchFamily="2" charset="2"/>
+                        </a:rPr>
+                        <a:t> 수정</a:t>
+                      </a:r>
+                      <a:endParaRPr lang="en-US" altLang="ko-KR" sz="1200" b="1" i="0" u="none" strike="noStrike" dirty="0" smtClean="0">
+                        <a:solidFill>
+                          <a:srgbClr val="000000"/>
+                        </a:solidFill>
+                        <a:effectLst/>
+                        <a:latin typeface="나눔바른고딕" pitchFamily="50" charset="-127"/>
+                        <a:ea typeface="나눔바른고딕" pitchFamily="50" charset="-127"/>
+                      </a:endParaRPr>
+                    </a:p>
+                  </a:txBody>
+                  <a:tcPr marL="72000" marR="72000" marT="72000" marB="72000">
+                    <a:solidFill>
+                      <a:schemeClr val="bg1"/>
+                    </a:solidFill>
+                  </a:tcPr>
+                </a:tc>
+                <a:extLst>
+                  <a:ext uri="{0D108BD9-81ED-4DB2-BD59-A6C34878D82A}">
+                    <a16:rowId xmlns:a16="http://schemas.microsoft.com/office/drawing/2014/main" xmlns="" val="10001"/>
+                  </a:ext>
+                </a:extLst>
+              </a:tr>
+              <a:tr h="1277863">
+                <a:tc>
+                  <a:txBody>
+                    <a:bodyPr/>
+                    <a:lstStyle/>
+                    <a:p>
+                      <a:pPr algn="ctr" fontAlgn="ctr"/>
+                      <a:r>
+                        <a:rPr lang="ko-KR" altLang="en-US" sz="1200" b="1" i="0" u="none" strike="noStrike" dirty="0" err="1" smtClean="0">
+                          <a:solidFill>
+                            <a:srgbClr val="000000"/>
+                          </a:solidFill>
+                          <a:effectLst/>
+                          <a:latin typeface="나눔바른고딕" pitchFamily="50" charset="-127"/>
+                          <a:ea typeface="나눔바른고딕" pitchFamily="50" charset="-127"/>
+                        </a:rPr>
+                        <a:t>펀딩하기</a:t>
+                      </a:r>
+                      <a:endParaRPr lang="ko-KR" altLang="en-US" sz="1200" b="1" i="0" u="none" strike="noStrike" dirty="0">
+                        <a:solidFill>
+                          <a:srgbClr val="000000"/>
+                        </a:solidFill>
+                        <a:effectLst/>
+                        <a:latin typeface="나눔바른고딕" pitchFamily="50" charset="-127"/>
+                        <a:ea typeface="나눔바른고딕" pitchFamily="50" charset="-127"/>
+                      </a:endParaRPr>
+                    </a:p>
+                  </a:txBody>
+                  <a:tcPr marL="5314" marR="5314" marT="5314" marB="0" anchor="ctr">
+                    <a:solidFill>
+                      <a:schemeClr val="bg1"/>
+                    </a:solidFill>
+                  </a:tcPr>
+                </a:tc>
+                <a:tc>
+                  <a:txBody>
+                    <a:bodyPr/>
+                    <a:lstStyle/>
+                    <a:p>
+                      <a:pPr algn="l" fontAlgn="ctr"/>
+                      <a:r>
+                        <a:rPr lang="en-US" altLang="ko-KR" sz="1200" b="1" i="0" u="none" strike="noStrike" dirty="0" smtClean="0">
+                          <a:solidFill>
+                            <a:srgbClr val="000000"/>
+                          </a:solidFill>
+                          <a:effectLst/>
+                          <a:latin typeface="나눔바른고딕" pitchFamily="50" charset="-127"/>
+                          <a:ea typeface="나눔바른고딕" pitchFamily="50" charset="-127"/>
+                        </a:rPr>
+                        <a:t>1. </a:t>
+                      </a:r>
+                      <a:r>
+                        <a:rPr lang="ko-KR" altLang="en-US" sz="1200" b="1" i="0" u="none" strike="noStrike" dirty="0" err="1" smtClean="0">
+                          <a:solidFill>
+                            <a:srgbClr val="000000"/>
+                          </a:solidFill>
+                          <a:effectLst/>
+                          <a:latin typeface="나눔바른고딕" pitchFamily="50" charset="-127"/>
+                          <a:ea typeface="나눔바른고딕" pitchFamily="50" charset="-127"/>
+                        </a:rPr>
+                        <a:t>펀딩하기</a:t>
+                      </a:r>
+                      <a:r>
+                        <a:rPr lang="ko-KR" altLang="en-US" sz="1200" b="1" i="0" u="none" strike="noStrike" dirty="0" smtClean="0">
+                          <a:solidFill>
+                            <a:srgbClr val="000000"/>
+                          </a:solidFill>
+                          <a:effectLst/>
+                          <a:latin typeface="나눔바른고딕" pitchFamily="50" charset="-127"/>
+                          <a:ea typeface="나눔바른고딕" pitchFamily="50" charset="-127"/>
+                        </a:rPr>
+                        <a:t> 클릭 시 </a:t>
+                      </a:r>
+                      <a:r>
+                        <a:rPr lang="ko-KR" altLang="en-US" sz="1200" b="1" i="0" u="none" strike="noStrike" dirty="0" err="1" smtClean="0">
+                          <a:solidFill>
+                            <a:srgbClr val="000000"/>
+                          </a:solidFill>
+                          <a:effectLst/>
+                          <a:latin typeface="나눔바른고딕" pitchFamily="50" charset="-127"/>
+                          <a:ea typeface="나눔바른고딕" pitchFamily="50" charset="-127"/>
+                        </a:rPr>
+                        <a:t>펀딩</a:t>
+                      </a:r>
+                      <a:r>
+                        <a:rPr lang="ko-KR" altLang="en-US" sz="1200" b="1" i="0" u="none" strike="noStrike" dirty="0" smtClean="0">
+                          <a:solidFill>
+                            <a:srgbClr val="000000"/>
+                          </a:solidFill>
+                          <a:effectLst/>
+                          <a:latin typeface="나눔바른고딕" pitchFamily="50" charset="-127"/>
+                          <a:ea typeface="나눔바른고딕" pitchFamily="50" charset="-127"/>
+                        </a:rPr>
+                        <a:t> 완료와 함께 프로젝트 리스트 페이지로 이동</a:t>
+                      </a:r>
+                    </a:p>
+                    <a:p>
+                      <a:pPr algn="l" fontAlgn="ctr"/>
+                      <a:r>
+                        <a:rPr lang="en-US" altLang="ko-KR" sz="1200" b="1" i="0" u="none" strike="noStrike" dirty="0" smtClean="0">
+                          <a:solidFill>
+                            <a:srgbClr val="000000"/>
+                          </a:solidFill>
+                          <a:effectLst/>
+                          <a:latin typeface="나눔바른고딕" pitchFamily="50" charset="-127"/>
+                          <a:ea typeface="나눔바른고딕" pitchFamily="50" charset="-127"/>
+                        </a:rPr>
+                        <a:t>2. </a:t>
+                      </a:r>
+                      <a:r>
+                        <a:rPr lang="ko-KR" altLang="en-US" sz="1200" b="1" i="0" u="none" strike="noStrike" dirty="0" err="1" smtClean="0">
+                          <a:solidFill>
+                            <a:srgbClr val="000000"/>
+                          </a:solidFill>
+                          <a:effectLst/>
+                          <a:latin typeface="나눔바른고딕" pitchFamily="50" charset="-127"/>
+                          <a:ea typeface="나눔바른고딕" pitchFamily="50" charset="-127"/>
+                        </a:rPr>
+                        <a:t>마이페이지</a:t>
+                      </a:r>
+                      <a:r>
+                        <a:rPr lang="ko-KR" altLang="en-US" sz="1200" b="1" i="0" u="none" strike="noStrike" dirty="0" smtClean="0">
+                          <a:solidFill>
+                            <a:srgbClr val="000000"/>
+                          </a:solidFill>
+                          <a:effectLst/>
+                          <a:latin typeface="나눔바른고딕" pitchFamily="50" charset="-127"/>
+                          <a:ea typeface="나눔바른고딕" pitchFamily="50" charset="-127"/>
+                        </a:rPr>
+                        <a:t> </a:t>
+                      </a:r>
+                      <a:r>
+                        <a:rPr lang="ko-KR" altLang="en-US" sz="1200" b="1" i="0" u="none" strike="noStrike" dirty="0" err="1" smtClean="0">
+                          <a:solidFill>
+                            <a:srgbClr val="000000"/>
+                          </a:solidFill>
+                          <a:effectLst/>
+                          <a:latin typeface="나눔바른고딕" pitchFamily="50" charset="-127"/>
+                          <a:ea typeface="나눔바른고딕" pitchFamily="50" charset="-127"/>
+                        </a:rPr>
+                        <a:t>펀딩내역에서</a:t>
+                      </a:r>
+                      <a:r>
+                        <a:rPr lang="ko-KR" altLang="en-US" sz="1200" b="1" i="0" u="none" strike="noStrike" dirty="0" smtClean="0">
+                          <a:solidFill>
+                            <a:srgbClr val="000000"/>
+                          </a:solidFill>
+                          <a:effectLst/>
+                          <a:latin typeface="나눔바른고딕" pitchFamily="50" charset="-127"/>
+                          <a:ea typeface="나눔바른고딕" pitchFamily="50" charset="-127"/>
+                        </a:rPr>
+                        <a:t> 확인</a:t>
+                      </a:r>
+                    </a:p>
+                    <a:p>
+                      <a:pPr algn="l" fontAlgn="ctr"/>
+                      <a:r>
+                        <a:rPr lang="en-US" altLang="ko-KR" sz="1200" b="1" i="0" u="none" strike="noStrike" dirty="0" smtClean="0">
+                          <a:solidFill>
+                            <a:srgbClr val="000000"/>
+                          </a:solidFill>
+                          <a:effectLst/>
+                          <a:latin typeface="나눔바른고딕" pitchFamily="50" charset="-127"/>
+                          <a:ea typeface="나눔바른고딕" pitchFamily="50" charset="-127"/>
+                        </a:rPr>
+                        <a:t>3. </a:t>
+                      </a:r>
+                      <a:r>
+                        <a:rPr lang="ko-KR" altLang="en-US" sz="1200" b="1" i="0" u="none" strike="noStrike" dirty="0" smtClean="0">
+                          <a:solidFill>
+                            <a:srgbClr val="000000"/>
+                          </a:solidFill>
+                          <a:effectLst/>
+                          <a:latin typeface="나눔바른고딕" pitchFamily="50" charset="-127"/>
+                          <a:ea typeface="나눔바른고딕" pitchFamily="50" charset="-127"/>
+                        </a:rPr>
+                        <a:t>예치금 내역에서 결제 정보 확인</a:t>
+                      </a:r>
+                    </a:p>
+                    <a:p>
+                      <a:pPr algn="l" fontAlgn="ctr"/>
+                      <a:r>
+                        <a:rPr lang="en-US" altLang="ko-KR" sz="1200" b="1" i="0" u="none" strike="noStrike" dirty="0" smtClean="0">
+                          <a:solidFill>
+                            <a:srgbClr val="000000"/>
+                          </a:solidFill>
+                          <a:effectLst/>
+                          <a:latin typeface="나눔바른고딕" pitchFamily="50" charset="-127"/>
+                          <a:ea typeface="나눔바른고딕" pitchFamily="50" charset="-127"/>
+                        </a:rPr>
+                        <a:t>4. </a:t>
+                      </a:r>
+                      <a:r>
+                        <a:rPr lang="ko-KR" altLang="en-US" sz="1200" b="1" i="0" u="none" strike="noStrike" dirty="0" smtClean="0">
+                          <a:solidFill>
+                            <a:srgbClr val="000000"/>
+                          </a:solidFill>
+                          <a:effectLst/>
+                          <a:latin typeface="나눔바른고딕" pitchFamily="50" charset="-127"/>
+                          <a:ea typeface="나눔바른고딕" pitchFamily="50" charset="-127"/>
+                        </a:rPr>
+                        <a:t>프로젝트 상세 페이지에서 현재 </a:t>
+                      </a:r>
+                      <a:r>
+                        <a:rPr lang="ko-KR" altLang="en-US" sz="1200" b="1" i="0" u="none" strike="noStrike" dirty="0" err="1" smtClean="0">
+                          <a:solidFill>
+                            <a:srgbClr val="000000"/>
+                          </a:solidFill>
+                          <a:effectLst/>
+                          <a:latin typeface="나눔바른고딕" pitchFamily="50" charset="-127"/>
+                          <a:ea typeface="나눔바른고딕" pitchFamily="50" charset="-127"/>
+                        </a:rPr>
+                        <a:t>펀딩된</a:t>
+                      </a:r>
+                      <a:r>
+                        <a:rPr lang="ko-KR" altLang="en-US" sz="1200" b="1" i="0" u="none" strike="noStrike" dirty="0" smtClean="0">
+                          <a:solidFill>
+                            <a:srgbClr val="000000"/>
+                          </a:solidFill>
+                          <a:effectLst/>
+                          <a:latin typeface="나눔바른고딕" pitchFamily="50" charset="-127"/>
+                          <a:ea typeface="나눔바른고딕" pitchFamily="50" charset="-127"/>
+                        </a:rPr>
+                        <a:t> 금액 증가</a:t>
+                      </a:r>
+                      <a:endParaRPr lang="ko-KR" altLang="en-US" sz="1200" b="1" i="0" u="none" strike="noStrike" dirty="0">
+                        <a:solidFill>
+                          <a:srgbClr val="000000"/>
+                        </a:solidFill>
+                        <a:effectLst/>
+                        <a:latin typeface="나눔바른고딕" pitchFamily="50" charset="-127"/>
+                        <a:ea typeface="나눔바른고딕" pitchFamily="50" charset="-127"/>
+                      </a:endParaRPr>
+                    </a:p>
+                  </a:txBody>
+                  <a:tcPr marL="72000" marR="72000" marT="72000" marB="72000">
+                    <a:solidFill>
+                      <a:schemeClr val="bg1"/>
+                    </a:solidFill>
+                  </a:tcPr>
+                </a:tc>
+                <a:tc>
+                  <a:txBody>
+                    <a:bodyPr/>
+                    <a:lstStyle/>
+                    <a:p>
+                      <a:pPr algn="l" fontAlgn="ctr"/>
+                      <a:r>
+                        <a:rPr lang="en-US" altLang="ko-KR" sz="1200" b="1" i="0" u="none" strike="noStrike" dirty="0" smtClean="0">
+                          <a:solidFill>
+                            <a:srgbClr val="000000"/>
+                          </a:solidFill>
+                          <a:effectLst/>
+                          <a:latin typeface="나눔바른고딕" pitchFamily="50" charset="-127"/>
+                          <a:ea typeface="나눔바른고딕" pitchFamily="50" charset="-127"/>
+                        </a:rPr>
+                        <a:t>1.</a:t>
+                      </a:r>
+                      <a:r>
+                        <a:rPr lang="en-US" altLang="ko-KR" sz="1200" b="1" i="0" u="none" strike="noStrike" baseline="0" dirty="0" smtClean="0">
+                          <a:solidFill>
+                            <a:srgbClr val="000000"/>
+                          </a:solidFill>
+                          <a:effectLst/>
+                          <a:latin typeface="나눔바른고딕" pitchFamily="50" charset="-127"/>
+                          <a:ea typeface="나눔바른고딕" pitchFamily="50" charset="-127"/>
+                        </a:rPr>
+                        <a:t> </a:t>
+                      </a:r>
+                      <a:r>
+                        <a:rPr lang="ko-KR" altLang="en-US" sz="1200" b="1" i="0" u="none" strike="noStrike" dirty="0" err="1" smtClean="0">
+                          <a:solidFill>
+                            <a:srgbClr val="000000"/>
+                          </a:solidFill>
+                          <a:effectLst/>
+                          <a:latin typeface="나눔바른고딕" pitchFamily="50" charset="-127"/>
+                          <a:ea typeface="나눔바른고딕" pitchFamily="50" charset="-127"/>
+                        </a:rPr>
+                        <a:t>펀딩하기</a:t>
+                      </a:r>
+                      <a:r>
+                        <a:rPr lang="ko-KR" altLang="en-US" sz="1200" b="1" i="0" u="none" strike="noStrike" dirty="0" smtClean="0">
+                          <a:solidFill>
+                            <a:srgbClr val="000000"/>
+                          </a:solidFill>
+                          <a:effectLst/>
+                          <a:latin typeface="나눔바른고딕" pitchFamily="50" charset="-127"/>
+                          <a:ea typeface="나눔바른고딕" pitchFamily="50" charset="-127"/>
+                        </a:rPr>
+                        <a:t> 클릭 시 리스트페이지로 이동 확인</a:t>
+                      </a:r>
+                      <a:endParaRPr lang="en-US" altLang="ko-KR" sz="1200" b="1" i="0" u="none" strike="noStrike" dirty="0" smtClean="0">
+                        <a:solidFill>
+                          <a:srgbClr val="000000"/>
+                        </a:solidFill>
+                        <a:effectLst/>
+                        <a:latin typeface="나눔바른고딕" pitchFamily="50" charset="-127"/>
+                        <a:ea typeface="나눔바른고딕" pitchFamily="50" charset="-127"/>
+                      </a:endParaRPr>
+                    </a:p>
+                    <a:p>
+                      <a:pPr algn="l" fontAlgn="ctr"/>
+                      <a:r>
+                        <a:rPr lang="en-US" altLang="ko-KR" sz="1200" b="1" i="0" u="none" strike="noStrike" dirty="0" smtClean="0">
+                          <a:solidFill>
+                            <a:srgbClr val="000000"/>
+                          </a:solidFill>
+                          <a:effectLst/>
+                          <a:latin typeface="나눔바른고딕" pitchFamily="50" charset="-127"/>
+                          <a:ea typeface="나눔바른고딕" pitchFamily="50" charset="-127"/>
+                        </a:rPr>
+                        <a:t>2.</a:t>
+                      </a:r>
+                      <a:r>
+                        <a:rPr lang="en-US" altLang="ko-KR" sz="1200" b="1" i="0" u="none" strike="noStrike" baseline="0" dirty="0" smtClean="0">
+                          <a:solidFill>
+                            <a:srgbClr val="000000"/>
+                          </a:solidFill>
+                          <a:effectLst/>
+                          <a:latin typeface="나눔바른고딕" pitchFamily="50" charset="-127"/>
+                          <a:ea typeface="나눔바른고딕" pitchFamily="50" charset="-127"/>
+                        </a:rPr>
+                        <a:t> </a:t>
+                      </a:r>
+                      <a:r>
+                        <a:rPr lang="ko-KR" altLang="en-US" sz="1200" b="1" i="0" u="none" strike="noStrike" dirty="0" err="1" smtClean="0">
+                          <a:solidFill>
+                            <a:srgbClr val="000000"/>
+                          </a:solidFill>
+                          <a:effectLst/>
+                          <a:latin typeface="나눔바른고딕" pitchFamily="50" charset="-127"/>
+                          <a:ea typeface="나눔바른고딕" pitchFamily="50" charset="-127"/>
+                        </a:rPr>
+                        <a:t>마이페이지</a:t>
+                      </a:r>
+                      <a:r>
+                        <a:rPr lang="ko-KR" altLang="en-US" sz="1200" b="1" i="0" u="none" strike="noStrike" dirty="0" smtClean="0">
+                          <a:solidFill>
+                            <a:srgbClr val="000000"/>
+                          </a:solidFill>
+                          <a:effectLst/>
+                          <a:latin typeface="나눔바른고딕" pitchFamily="50" charset="-127"/>
+                          <a:ea typeface="나눔바른고딕" pitchFamily="50" charset="-127"/>
+                        </a:rPr>
+                        <a:t> </a:t>
+                      </a:r>
+                      <a:r>
+                        <a:rPr lang="ko-KR" altLang="en-US" sz="1200" b="1" i="0" u="none" strike="noStrike" dirty="0" err="1" smtClean="0">
+                          <a:solidFill>
+                            <a:srgbClr val="000000"/>
+                          </a:solidFill>
+                          <a:effectLst/>
+                          <a:latin typeface="나눔바른고딕" pitchFamily="50" charset="-127"/>
+                          <a:ea typeface="나눔바른고딕" pitchFamily="50" charset="-127"/>
+                        </a:rPr>
+                        <a:t>펀딩내역</a:t>
+                      </a:r>
+                      <a:r>
+                        <a:rPr lang="ko-KR" altLang="en-US" sz="1200" b="1" i="0" u="none" strike="noStrike" dirty="0" smtClean="0">
+                          <a:solidFill>
+                            <a:srgbClr val="000000"/>
+                          </a:solidFill>
+                          <a:effectLst/>
+                          <a:latin typeface="나눔바른고딕" pitchFamily="50" charset="-127"/>
+                          <a:ea typeface="나눔바른고딕" pitchFamily="50" charset="-127"/>
+                        </a:rPr>
+                        <a:t> 확인</a:t>
+                      </a:r>
+                      <a:endParaRPr lang="en-US" altLang="ko-KR" sz="1200" b="1" i="0" u="none" strike="noStrike" dirty="0" smtClean="0">
+                        <a:solidFill>
+                          <a:srgbClr val="000000"/>
+                        </a:solidFill>
+                        <a:effectLst/>
+                        <a:latin typeface="나눔바른고딕" pitchFamily="50" charset="-127"/>
+                        <a:ea typeface="나눔바른고딕" pitchFamily="50" charset="-127"/>
+                      </a:endParaRPr>
+                    </a:p>
+                    <a:p>
+                      <a:pPr algn="l" fontAlgn="ctr"/>
+                      <a:r>
+                        <a:rPr lang="en-US" altLang="ko-KR" sz="1200" b="1" i="0" u="none" strike="noStrike" dirty="0" smtClean="0">
+                          <a:solidFill>
+                            <a:srgbClr val="000000"/>
+                          </a:solidFill>
+                          <a:effectLst/>
+                          <a:latin typeface="나눔바른고딕" pitchFamily="50" charset="-127"/>
+                          <a:ea typeface="나눔바른고딕" pitchFamily="50" charset="-127"/>
+                        </a:rPr>
+                        <a:t>3.</a:t>
+                      </a:r>
+                      <a:r>
+                        <a:rPr lang="en-US" altLang="ko-KR" sz="1200" b="1" i="0" u="none" strike="noStrike" baseline="0" dirty="0" smtClean="0">
+                          <a:solidFill>
+                            <a:srgbClr val="000000"/>
+                          </a:solidFill>
+                          <a:effectLst/>
+                          <a:latin typeface="나눔바른고딕" pitchFamily="50" charset="-127"/>
+                          <a:ea typeface="나눔바른고딕" pitchFamily="50" charset="-127"/>
+                        </a:rPr>
+                        <a:t> </a:t>
+                      </a:r>
+                      <a:r>
+                        <a:rPr lang="ko-KR" altLang="en-US" sz="1200" b="1" i="0" u="none" strike="noStrike" dirty="0" smtClean="0">
+                          <a:solidFill>
+                            <a:srgbClr val="000000"/>
+                          </a:solidFill>
+                          <a:effectLst/>
+                          <a:latin typeface="나눔바른고딕" pitchFamily="50" charset="-127"/>
+                          <a:ea typeface="나눔바른고딕" pitchFamily="50" charset="-127"/>
+                        </a:rPr>
+                        <a:t>예치금 내역 결제정보확인</a:t>
+                      </a:r>
+                      <a:endParaRPr lang="en-US" altLang="ko-KR" sz="1200" b="1" i="0" u="none" strike="noStrike" dirty="0" smtClean="0">
+                        <a:solidFill>
+                          <a:srgbClr val="000000"/>
+                        </a:solidFill>
+                        <a:effectLst/>
+                        <a:latin typeface="나눔바른고딕" pitchFamily="50" charset="-127"/>
+                        <a:ea typeface="나눔바른고딕" pitchFamily="50" charset="-127"/>
+                      </a:endParaRPr>
+                    </a:p>
+                    <a:p>
+                      <a:pPr algn="l" fontAlgn="ctr"/>
+                      <a:r>
+                        <a:rPr lang="en-US" altLang="ko-KR" sz="1200" b="1" i="0" u="none" strike="noStrike" dirty="0" smtClean="0">
+                          <a:solidFill>
+                            <a:srgbClr val="000000"/>
+                          </a:solidFill>
+                          <a:effectLst/>
+                          <a:latin typeface="나눔바른고딕" pitchFamily="50" charset="-127"/>
+                          <a:ea typeface="나눔바른고딕" pitchFamily="50" charset="-127"/>
+                        </a:rPr>
+                        <a:t>4. </a:t>
+                      </a:r>
+                      <a:r>
+                        <a:rPr lang="ko-KR" altLang="en-US" sz="1200" b="1" i="0" u="none" strike="noStrike" dirty="0" smtClean="0">
+                          <a:solidFill>
+                            <a:srgbClr val="000000"/>
+                          </a:solidFill>
+                          <a:effectLst/>
+                          <a:latin typeface="나눔바른고딕" pitchFamily="50" charset="-127"/>
+                          <a:ea typeface="나눔바른고딕" pitchFamily="50" charset="-127"/>
+                        </a:rPr>
+                        <a:t>현재 </a:t>
+                      </a:r>
+                      <a:r>
+                        <a:rPr lang="ko-KR" altLang="en-US" sz="1200" b="1" i="0" u="none" strike="noStrike" dirty="0" err="1" smtClean="0">
+                          <a:solidFill>
+                            <a:srgbClr val="000000"/>
+                          </a:solidFill>
+                          <a:effectLst/>
+                          <a:latin typeface="나눔바른고딕" pitchFamily="50" charset="-127"/>
+                          <a:ea typeface="나눔바른고딕" pitchFamily="50" charset="-127"/>
+                        </a:rPr>
+                        <a:t>펀딩금액이</a:t>
+                      </a:r>
+                      <a:r>
+                        <a:rPr lang="ko-KR" altLang="en-US" sz="1200" b="1" i="0" u="none" strike="noStrike" dirty="0" smtClean="0">
+                          <a:solidFill>
+                            <a:srgbClr val="000000"/>
+                          </a:solidFill>
+                          <a:effectLst/>
+                          <a:latin typeface="나눔바른고딕" pitchFamily="50" charset="-127"/>
+                          <a:ea typeface="나눔바른고딕" pitchFamily="50" charset="-127"/>
+                        </a:rPr>
+                        <a:t> </a:t>
+                      </a:r>
+                      <a:r>
+                        <a:rPr lang="en-US" altLang="ko-KR" sz="1200" b="1" i="0" u="none" strike="noStrike" dirty="0" smtClean="0">
+                          <a:solidFill>
+                            <a:srgbClr val="000000"/>
+                          </a:solidFill>
+                          <a:effectLst/>
+                          <a:latin typeface="나눔바른고딕" pitchFamily="50" charset="-127"/>
+                          <a:ea typeface="나눔바른고딕" pitchFamily="50" charset="-127"/>
+                        </a:rPr>
+                        <a:t>0</a:t>
+                      </a:r>
+                      <a:r>
+                        <a:rPr lang="ko-KR" altLang="en-US" sz="1200" b="1" i="0" u="none" strike="noStrike" dirty="0" smtClean="0">
+                          <a:solidFill>
+                            <a:srgbClr val="000000"/>
+                          </a:solidFill>
+                          <a:effectLst/>
+                          <a:latin typeface="나눔바른고딕" pitchFamily="50" charset="-127"/>
+                          <a:ea typeface="나눔바른고딕" pitchFamily="50" charset="-127"/>
+                        </a:rPr>
+                        <a:t>원인 프로젝트에서는 </a:t>
+                      </a:r>
+                      <a:r>
+                        <a:rPr lang="ko-KR" altLang="en-US" sz="1200" b="1" i="0" u="none" strike="noStrike" dirty="0" err="1" smtClean="0">
+                          <a:solidFill>
+                            <a:srgbClr val="000000"/>
+                          </a:solidFill>
+                          <a:effectLst/>
+                          <a:latin typeface="나눔바른고딕" pitchFamily="50" charset="-127"/>
+                          <a:ea typeface="나눔바른고딕" pitchFamily="50" charset="-127"/>
+                        </a:rPr>
+                        <a:t>펀딩된</a:t>
+                      </a:r>
+                      <a:r>
+                        <a:rPr lang="ko-KR" altLang="en-US" sz="1200" b="1" i="0" u="none" strike="noStrike" dirty="0" smtClean="0">
+                          <a:solidFill>
+                            <a:srgbClr val="000000"/>
+                          </a:solidFill>
+                          <a:effectLst/>
+                          <a:latin typeface="나눔바른고딕" pitchFamily="50" charset="-127"/>
+                          <a:ea typeface="나눔바른고딕" pitchFamily="50" charset="-127"/>
+                        </a:rPr>
+                        <a:t> 금액 증가</a:t>
+                      </a:r>
+                      <a:r>
+                        <a:rPr lang="ko-KR" altLang="en-US" sz="1200" b="1" i="0" u="none" strike="noStrike" baseline="0" dirty="0" smtClean="0">
+                          <a:solidFill>
+                            <a:srgbClr val="000000"/>
+                          </a:solidFill>
+                          <a:effectLst/>
+                          <a:latin typeface="나눔바른고딕" pitchFamily="50" charset="-127"/>
+                          <a:ea typeface="나눔바른고딕" pitchFamily="50" charset="-127"/>
+                        </a:rPr>
+                        <a:t> 하지 않음</a:t>
+                      </a:r>
+                      <a:endParaRPr lang="en-US" altLang="ko-KR" sz="1200" b="1" i="0" u="none" strike="noStrike" dirty="0">
+                        <a:solidFill>
+                          <a:srgbClr val="000000"/>
+                        </a:solidFill>
+                        <a:effectLst/>
+                        <a:latin typeface="나눔바른고딕" pitchFamily="50" charset="-127"/>
+                        <a:ea typeface="나눔바른고딕" pitchFamily="50" charset="-127"/>
+                      </a:endParaRPr>
+                    </a:p>
+                  </a:txBody>
+                  <a:tcPr marL="72000" marR="72000" marT="72000" marB="72000">
+                    <a:solidFill>
+                      <a:schemeClr val="bg1"/>
+                    </a:solidFill>
+                  </a:tcPr>
+                </a:tc>
+                <a:tc>
+                  <a:txBody>
+                    <a:bodyPr/>
+                    <a:lstStyle/>
+                    <a:p>
+                      <a:pPr marL="0" marR="0" indent="0" algn="l" defTabSz="914400" rtl="0" eaLnBrk="1" fontAlgn="ctr" latinLnBrk="0" hangingPunct="1">
+                        <a:lnSpc>
+                          <a:spcPct val="100000"/>
+                        </a:lnSpc>
+                        <a:spcBef>
+                          <a:spcPts val="0"/>
+                        </a:spcBef>
+                        <a:spcAft>
+                          <a:spcPts val="0"/>
+                        </a:spcAft>
+                        <a:buClr>
+                          <a:srgbClr val="000000"/>
+                        </a:buClr>
+                        <a:buSzTx/>
+                        <a:buFont typeface="Arial"/>
+                        <a:buNone/>
+                        <a:tabLst/>
+                        <a:defRPr/>
+                      </a:pPr>
+                      <a:r>
+                        <a:rPr lang="en-US" altLang="ko-KR" sz="1200" b="1" i="0" u="none" strike="noStrike" dirty="0" smtClean="0">
+                          <a:solidFill>
+                            <a:srgbClr val="000000"/>
+                          </a:solidFill>
+                          <a:effectLst/>
+                          <a:latin typeface="나눔바른고딕" pitchFamily="50" charset="-127"/>
+                          <a:ea typeface="나눔바른고딕" pitchFamily="50" charset="-127"/>
+                        </a:rPr>
+                        <a:t>4. </a:t>
+                      </a:r>
+                      <a:r>
+                        <a:rPr lang="ko-KR" altLang="en-US" sz="1200" b="1" i="0" u="none" strike="noStrike" dirty="0" smtClean="0">
+                          <a:solidFill>
+                            <a:srgbClr val="000000"/>
+                          </a:solidFill>
+                          <a:effectLst/>
+                          <a:latin typeface="나눔바른고딕" pitchFamily="50" charset="-127"/>
+                          <a:ea typeface="나눔바른고딕" pitchFamily="50" charset="-127"/>
+                        </a:rPr>
+                        <a:t>현재 </a:t>
+                      </a:r>
+                      <a:r>
+                        <a:rPr lang="ko-KR" altLang="en-US" sz="1200" b="1" i="0" u="none" strike="noStrike" dirty="0" err="1" smtClean="0">
+                          <a:solidFill>
+                            <a:srgbClr val="000000"/>
+                          </a:solidFill>
+                          <a:effectLst/>
+                          <a:latin typeface="나눔바른고딕" pitchFamily="50" charset="-127"/>
+                          <a:ea typeface="나눔바른고딕" pitchFamily="50" charset="-127"/>
+                        </a:rPr>
+                        <a:t>펀딩금액이</a:t>
+                      </a:r>
+                      <a:r>
+                        <a:rPr lang="ko-KR" altLang="en-US" sz="1200" b="1" i="0" u="none" strike="noStrike" dirty="0" smtClean="0">
+                          <a:solidFill>
+                            <a:srgbClr val="000000"/>
+                          </a:solidFill>
+                          <a:effectLst/>
+                          <a:latin typeface="나눔바른고딕" pitchFamily="50" charset="-127"/>
+                          <a:ea typeface="나눔바른고딕" pitchFamily="50" charset="-127"/>
+                        </a:rPr>
+                        <a:t> </a:t>
+                      </a:r>
+                      <a:r>
+                        <a:rPr lang="en-US" altLang="ko-KR" sz="1200" b="1" i="0" u="none" strike="noStrike" dirty="0" smtClean="0">
+                          <a:solidFill>
+                            <a:srgbClr val="000000"/>
+                          </a:solidFill>
+                          <a:effectLst/>
+                          <a:latin typeface="나눔바른고딕" pitchFamily="50" charset="-127"/>
+                          <a:ea typeface="나눔바른고딕" pitchFamily="50" charset="-127"/>
+                        </a:rPr>
+                        <a:t>0</a:t>
+                      </a:r>
+                      <a:r>
+                        <a:rPr lang="ko-KR" altLang="en-US" sz="1200" b="1" i="0" u="none" strike="noStrike" dirty="0" smtClean="0">
+                          <a:solidFill>
+                            <a:srgbClr val="000000"/>
+                          </a:solidFill>
+                          <a:effectLst/>
+                          <a:latin typeface="나눔바른고딕" pitchFamily="50" charset="-127"/>
+                          <a:ea typeface="나눔바른고딕" pitchFamily="50" charset="-127"/>
+                        </a:rPr>
+                        <a:t>원인 프로젝트에서는 </a:t>
+                      </a:r>
+                      <a:r>
+                        <a:rPr lang="ko-KR" altLang="en-US" sz="1200" b="1" i="0" u="none" strike="noStrike" dirty="0" err="1" smtClean="0">
+                          <a:solidFill>
+                            <a:srgbClr val="000000"/>
+                          </a:solidFill>
+                          <a:effectLst/>
+                          <a:latin typeface="나눔바른고딕" pitchFamily="50" charset="-127"/>
+                          <a:ea typeface="나눔바른고딕" pitchFamily="50" charset="-127"/>
+                        </a:rPr>
+                        <a:t>펀딩된</a:t>
+                      </a:r>
+                      <a:r>
+                        <a:rPr lang="ko-KR" altLang="en-US" sz="1200" b="1" i="0" u="none" strike="noStrike" dirty="0" smtClean="0">
+                          <a:solidFill>
+                            <a:srgbClr val="000000"/>
+                          </a:solidFill>
+                          <a:effectLst/>
+                          <a:latin typeface="나눔바른고딕" pitchFamily="50" charset="-127"/>
+                          <a:ea typeface="나눔바른고딕" pitchFamily="50" charset="-127"/>
+                        </a:rPr>
+                        <a:t> 금액 증가</a:t>
+                      </a:r>
+                      <a:r>
+                        <a:rPr lang="ko-KR" altLang="en-US" sz="1200" b="1" i="0" u="none" strike="noStrike" baseline="0" dirty="0" smtClean="0">
+                          <a:solidFill>
+                            <a:srgbClr val="000000"/>
+                          </a:solidFill>
+                          <a:effectLst/>
+                          <a:latin typeface="나눔바른고딕" pitchFamily="50" charset="-127"/>
+                          <a:ea typeface="나눔바른고딕" pitchFamily="50" charset="-127"/>
+                        </a:rPr>
+                        <a:t> 하지 않음</a:t>
+                      </a:r>
+                      <a:endParaRPr lang="en-US" altLang="ko-KR" sz="1200" b="1" i="0" u="none" strike="noStrike" dirty="0" smtClean="0">
+                        <a:solidFill>
+                          <a:srgbClr val="000000"/>
+                        </a:solidFill>
+                        <a:effectLst/>
+                        <a:latin typeface="나눔바른고딕" pitchFamily="50" charset="-127"/>
+                        <a:ea typeface="나눔바른고딕" pitchFamily="50" charset="-127"/>
+                      </a:endParaRPr>
+                    </a:p>
+                    <a:p>
+                      <a:pPr algn="l" fontAlgn="ctr"/>
+                      <a:r>
+                        <a:rPr lang="en-US" altLang="ko-KR" sz="1200" b="1" i="0" u="none" strike="noStrike" dirty="0" smtClean="0">
+                          <a:solidFill>
+                            <a:srgbClr val="000000"/>
+                          </a:solidFill>
+                          <a:effectLst/>
+                          <a:latin typeface="나눔바른고딕" pitchFamily="50" charset="-127"/>
+                          <a:ea typeface="나눔바른고딕" pitchFamily="50" charset="-127"/>
+                          <a:sym typeface="Wingdings" panose="05000000000000000000" pitchFamily="2" charset="2"/>
+                        </a:rPr>
+                        <a:t> </a:t>
+                      </a:r>
+                      <a:r>
+                        <a:rPr lang="ko-KR" altLang="en-US" sz="1200" b="1" i="0" u="none" strike="noStrike" dirty="0" smtClean="0">
+                          <a:solidFill>
+                            <a:srgbClr val="000000"/>
+                          </a:solidFill>
+                          <a:effectLst/>
+                          <a:latin typeface="나눔바른고딕" pitchFamily="50" charset="-127"/>
+                          <a:ea typeface="나눔바른고딕" pitchFamily="50" charset="-127"/>
+                          <a:sym typeface="Wingdings" panose="05000000000000000000" pitchFamily="2" charset="2"/>
+                        </a:rPr>
+                        <a:t>데이터베이스에서 </a:t>
+                      </a:r>
+                      <a:r>
+                        <a:rPr lang="ko-KR" altLang="en-US" sz="1200" b="1" i="0" u="none" strike="noStrike" dirty="0" err="1" smtClean="0">
+                          <a:solidFill>
+                            <a:srgbClr val="000000"/>
+                          </a:solidFill>
+                          <a:effectLst/>
+                          <a:latin typeface="나눔바른고딕" pitchFamily="50" charset="-127"/>
+                          <a:ea typeface="나눔바른고딕" pitchFamily="50" charset="-127"/>
+                          <a:sym typeface="Wingdings" panose="05000000000000000000" pitchFamily="2" charset="2"/>
+                        </a:rPr>
+                        <a:t>현재펀딩금액이</a:t>
+                      </a:r>
+                      <a:r>
+                        <a:rPr lang="ko-KR" altLang="en-US" sz="1200" b="1" i="0" u="none" strike="noStrike" dirty="0" smtClean="0">
+                          <a:solidFill>
+                            <a:srgbClr val="000000"/>
+                          </a:solidFill>
+                          <a:effectLst/>
+                          <a:latin typeface="나눔바른고딕" pitchFamily="50" charset="-127"/>
+                          <a:ea typeface="나눔바른고딕" pitchFamily="50" charset="-127"/>
+                          <a:sym typeface="Wingdings" panose="05000000000000000000" pitchFamily="2" charset="2"/>
+                        </a:rPr>
+                        <a:t> </a:t>
+                      </a:r>
+                      <a:r>
+                        <a:rPr lang="en-US" altLang="ko-KR" sz="1200" b="1" i="0" u="none" strike="noStrike" dirty="0" smtClean="0">
+                          <a:solidFill>
+                            <a:srgbClr val="000000"/>
+                          </a:solidFill>
+                          <a:effectLst/>
+                          <a:latin typeface="나눔바른고딕" pitchFamily="50" charset="-127"/>
+                          <a:ea typeface="나눔바른고딕" pitchFamily="50" charset="-127"/>
+                          <a:sym typeface="Wingdings" panose="05000000000000000000" pitchFamily="2" charset="2"/>
+                        </a:rPr>
+                        <a:t>0</a:t>
+                      </a:r>
+                      <a:r>
+                        <a:rPr lang="ko-KR" altLang="en-US" sz="1200" b="1" i="0" u="none" strike="noStrike" dirty="0" smtClean="0">
+                          <a:solidFill>
+                            <a:srgbClr val="000000"/>
+                          </a:solidFill>
+                          <a:effectLst/>
+                          <a:latin typeface="나눔바른고딕" pitchFamily="50" charset="-127"/>
+                          <a:ea typeface="나눔바른고딕" pitchFamily="50" charset="-127"/>
+                          <a:sym typeface="Wingdings" panose="05000000000000000000" pitchFamily="2" charset="2"/>
+                        </a:rPr>
+                        <a:t>이 아닌 </a:t>
+                      </a:r>
+                      <a:r>
+                        <a:rPr lang="en-US" altLang="ko-KR" sz="1200" b="1" i="0" u="none" strike="noStrike" dirty="0" smtClean="0">
+                          <a:solidFill>
+                            <a:srgbClr val="000000"/>
+                          </a:solidFill>
+                          <a:effectLst/>
+                          <a:latin typeface="나눔바른고딕" pitchFamily="50" charset="-127"/>
+                          <a:ea typeface="나눔바른고딕" pitchFamily="50" charset="-127"/>
+                          <a:sym typeface="Wingdings" panose="05000000000000000000" pitchFamily="2" charset="2"/>
+                        </a:rPr>
+                        <a:t>NULL</a:t>
+                      </a:r>
+                      <a:r>
+                        <a:rPr lang="ko-KR" altLang="en-US" sz="1200" b="1" i="0" u="none" strike="noStrike" dirty="0" smtClean="0">
+                          <a:solidFill>
+                            <a:srgbClr val="000000"/>
+                          </a:solidFill>
+                          <a:effectLst/>
+                          <a:latin typeface="나눔바른고딕" pitchFamily="50" charset="-127"/>
+                          <a:ea typeface="나눔바른고딕" pitchFamily="50" charset="-127"/>
+                          <a:sym typeface="Wingdings" panose="05000000000000000000" pitchFamily="2" charset="2"/>
+                        </a:rPr>
+                        <a:t>이기 때문에 적용이 안됨</a:t>
+                      </a:r>
+                      <a:r>
+                        <a:rPr lang="en-US" altLang="ko-KR" sz="1200" b="1" i="0" u="none" strike="noStrike" dirty="0" smtClean="0">
+                          <a:solidFill>
+                            <a:srgbClr val="000000"/>
+                          </a:solidFill>
+                          <a:effectLst/>
+                          <a:latin typeface="나눔바른고딕" pitchFamily="50" charset="-127"/>
+                          <a:ea typeface="나눔바른고딕" pitchFamily="50" charset="-127"/>
+                          <a:sym typeface="Wingdings" panose="05000000000000000000" pitchFamily="2" charset="2"/>
+                        </a:rPr>
+                        <a:t>,</a:t>
+                      </a:r>
+                      <a:r>
+                        <a:rPr lang="en-US" altLang="ko-KR" sz="1200" b="1" i="0" u="none" strike="noStrike" baseline="0" dirty="0" smtClean="0">
+                          <a:solidFill>
+                            <a:srgbClr val="000000"/>
+                          </a:solidFill>
+                          <a:effectLst/>
+                          <a:latin typeface="나눔바른고딕" pitchFamily="50" charset="-127"/>
+                          <a:ea typeface="나눔바른고딕" pitchFamily="50" charset="-127"/>
+                          <a:sym typeface="Wingdings" panose="05000000000000000000" pitchFamily="2" charset="2"/>
+                        </a:rPr>
+                        <a:t> </a:t>
+                      </a:r>
+                      <a:r>
+                        <a:rPr lang="ko-KR" altLang="en-US" sz="1200" b="1" i="0" u="none" strike="noStrike" baseline="0" dirty="0" smtClean="0">
+                          <a:solidFill>
+                            <a:srgbClr val="000000"/>
+                          </a:solidFill>
+                          <a:effectLst/>
+                          <a:latin typeface="나눔바른고딕" pitchFamily="50" charset="-127"/>
+                          <a:ea typeface="나눔바른고딕" pitchFamily="50" charset="-127"/>
+                          <a:sym typeface="Wingdings" panose="05000000000000000000" pitchFamily="2" charset="2"/>
+                        </a:rPr>
+                        <a:t>현재 프로젝트 오픈 시 </a:t>
+                      </a:r>
+                      <a:r>
+                        <a:rPr lang="en-US" altLang="ko-KR" sz="1200" b="1" i="0" u="none" strike="noStrike" baseline="0" dirty="0" smtClean="0">
+                          <a:solidFill>
+                            <a:srgbClr val="000000"/>
+                          </a:solidFill>
+                          <a:effectLst/>
+                          <a:latin typeface="나눔바른고딕" pitchFamily="50" charset="-127"/>
+                          <a:ea typeface="나눔바른고딕" pitchFamily="50" charset="-127"/>
+                          <a:sym typeface="Wingdings" panose="05000000000000000000" pitchFamily="2" charset="2"/>
+                        </a:rPr>
+                        <a:t>NULL</a:t>
+                      </a:r>
+                      <a:r>
+                        <a:rPr lang="ko-KR" altLang="en-US" sz="1200" b="1" i="0" u="none" strike="noStrike" baseline="0" dirty="0" smtClean="0">
+                          <a:solidFill>
+                            <a:srgbClr val="000000"/>
+                          </a:solidFill>
+                          <a:effectLst/>
+                          <a:latin typeface="나눔바른고딕" pitchFamily="50" charset="-127"/>
+                          <a:ea typeface="나눔바른고딕" pitchFamily="50" charset="-127"/>
+                          <a:sym typeface="Wingdings" panose="05000000000000000000" pitchFamily="2" charset="2"/>
+                        </a:rPr>
+                        <a:t>이 아닌 </a:t>
+                      </a:r>
+                      <a:r>
+                        <a:rPr lang="en-US" altLang="ko-KR" sz="1200" b="1" i="0" u="none" strike="noStrike" baseline="0" dirty="0" smtClean="0">
+                          <a:solidFill>
+                            <a:srgbClr val="000000"/>
+                          </a:solidFill>
+                          <a:effectLst/>
+                          <a:latin typeface="나눔바른고딕" pitchFamily="50" charset="-127"/>
+                          <a:ea typeface="나눔바른고딕" pitchFamily="50" charset="-127"/>
+                          <a:sym typeface="Wingdings" panose="05000000000000000000" pitchFamily="2" charset="2"/>
+                        </a:rPr>
+                        <a:t>0</a:t>
+                      </a:r>
+                      <a:r>
+                        <a:rPr lang="ko-KR" altLang="en-US" sz="1200" b="1" i="0" u="none" strike="noStrike" baseline="0" dirty="0" smtClean="0">
+                          <a:solidFill>
+                            <a:srgbClr val="000000"/>
+                          </a:solidFill>
+                          <a:effectLst/>
+                          <a:latin typeface="나눔바른고딕" pitchFamily="50" charset="-127"/>
+                          <a:ea typeface="나눔바른고딕" pitchFamily="50" charset="-127"/>
+                          <a:sym typeface="Wingdings" panose="05000000000000000000" pitchFamily="2" charset="2"/>
+                        </a:rPr>
+                        <a:t>으로 수정 완료</a:t>
+                      </a:r>
+                      <a:endParaRPr lang="en-US" altLang="ko-KR" sz="1200" b="1" i="0" u="none" strike="noStrike" dirty="0">
+                        <a:solidFill>
+                          <a:srgbClr val="000000"/>
+                        </a:solidFill>
+                        <a:effectLst/>
+                        <a:latin typeface="나눔바른고딕" pitchFamily="50" charset="-127"/>
+                        <a:ea typeface="나눔바른고딕" pitchFamily="50" charset="-127"/>
+                      </a:endParaRPr>
+                    </a:p>
+                  </a:txBody>
+                  <a:tcPr marL="72000" marR="72000" marT="72000" marB="72000">
+                    <a:solidFill>
+                      <a:schemeClr val="bg1"/>
+                    </a:solidFill>
+                  </a:tcPr>
+                </a:tc>
+                <a:extLst>
+                  <a:ext uri="{0D108BD9-81ED-4DB2-BD59-A6C34878D82A}">
+                    <a16:rowId xmlns:a16="http://schemas.microsoft.com/office/drawing/2014/main" xmlns="" val="1377291653"/>
+                  </a:ext>
+                </a:extLst>
+              </a:tr>
+            </a:tbl>
+          </a:graphicData>
+        </a:graphic>
+      </p:graphicFrame>
+      <p:pic>
+        <p:nvPicPr>
+          <p:cNvPr id="11" name="그림 10"/>
+          <p:cNvPicPr>
+            <a:picLocks noChangeAspect="1"/>
+          </p:cNvPicPr>
+          <p:nvPr/>
+        </p:nvPicPr>
+        <p:blipFill>
+          <a:blip r:embed="rId2" cstate="print">
+            <a:extLst>
+              <a:ext uri="{28A0092B-C50C-407E-A947-70E740481C1C}">
+                <a14:useLocalDpi xmlns:a14="http://schemas.microsoft.com/office/drawing/2010/main" val="0"/>
+              </a:ext>
+            </a:extLst>
+          </a:blip>
+          <a:stretch>
+            <a:fillRect/>
+          </a:stretch>
+        </p:blipFill>
+        <p:spPr>
+          <a:xfrm>
+            <a:off x="994341" y="587441"/>
+            <a:ext cx="723852" cy="723852"/>
+          </a:xfrm>
+          <a:prstGeom prst="rect">
+            <a:avLst/>
+          </a:prstGeom>
+        </p:spPr>
+      </p:pic>
+    </p:spTree>
+    <p:extLst>
+      <p:ext uri="{BB962C8B-B14F-4D97-AF65-F5344CB8AC3E}">
+        <p14:creationId xmlns:p14="http://schemas.microsoft.com/office/powerpoint/2010/main" val="2439834370"/>
+      </p:ext>
+    </p:extLst>
+  </p:cSld>
+  <p:clrMapOvr>
+    <a:masterClrMapping/>
+  </p:clrMapOvr>
+  <p:timing>
+    <p:tnLst>
+      <p:par>
+        <p:cTn id="1" dur="indefinite" restart="never" nodeType="tmRoot"/>
+      </p:par>
+    </p:tnLst>
+  </p:timing>
+</p:sld>
+</file>
+
 <file path=ppt/slides/slide3.xml><?xml version="1.0" encoding="utf-8"?>
 <p:sld xmlns:a="http://schemas.openxmlformats.org/drawingml/2006/main" xmlns:r="http://schemas.openxmlformats.org/officeDocument/2006/relationships" xmlns:p="http://schemas.openxmlformats.org/presentationml/2006/main">
   <p:cSld>
@@ -26703,15 +28728,7 @@
             </a:r>
             <a:r>
               <a:rPr lang="ko-KR" altLang="en-US" sz="1200" dirty="0" smtClean="0"/>
-              <a:t> 페이지 접</a:t>
-            </a:r>
-            <a:r>
-              <a:rPr lang="ko-KR" altLang="en-US" sz="1200" dirty="0" smtClean="0"/>
-              <a:t>속</a:t>
-            </a:r>
-            <a:r>
-              <a:rPr lang="ko-KR" altLang="en-US" sz="1200" dirty="0" smtClean="0"/>
-              <a:t> </a:t>
+              <a:t> 페이지 접속 </a:t>
             </a:r>
             <a:r>
               <a:rPr lang="en-US" altLang="ko-KR" sz="1200" dirty="0" smtClean="0"/>
@@ -28656,7 +30673,6 @@
               <a:rPr lang="en-US" altLang="ko-KR" sz="1200" dirty="0" smtClean="0"/>
               <a:t>)</a:t>
             </a:r>
-            <a:endParaRPr lang="en-US" altLang="ko-KR" sz="1200" dirty="0" smtClean="0"/>
           </a:p>
           <a:p>
             <a:pPr marL="180000" indent="-360000" latinLnBrk="0"/>
@@ -30138,16 +32154,7 @@
                 </a:solidFill>
                 <a:latin typeface="Consolas" panose="020B0609020204030204" pitchFamily="49" charset="0"/>
               </a:rPr>
-              <a:t>에서는 </a:t>
-            </a:r>
-            <a:r>
-              <a:rPr lang="ko-KR" altLang="en-US" sz="1200" dirty="0" smtClean="0">
-                <a:solidFill>
-                  <a:srgbClr val="000000"/>
-                </a:solidFill>
-                <a:latin typeface="Consolas" panose="020B0609020204030204" pitchFamily="49" charset="0"/>
-              </a:rPr>
-              <a:t>특수문자와 연산자의 구분을 위해 </a:t>
+              <a:t>에서는 특수문자와 연산자의 구분을 위해 </a:t>
             </a:r>
             <a:r>
               <a:rPr lang="en-US" altLang="ko-KR" sz="1200" dirty="0" smtClean="0"/>

</xml_diff>